<commit_message>
Add stdPicture to project structure
</commit_message>
<xml_diff>
--- a/Examples/Spreadsheet Extractor/docs/GithubOverview.pptx
+++ b/Examples/Spreadsheet Extractor/docs/GithubOverview.pptx
@@ -7,6 +7,7 @@
   <p:sldIdLst>
     <p:sldId id="256" r:id="rId2"/>
     <p:sldId id="257" r:id="rId3"/>
+    <p:sldId id="258" r:id="rId4"/>
   </p:sldIdLst>
   <p:sldSz cx="12192000" cy="6858000"/>
   <p:notesSz cx="6858000" cy="9144000"/>
@@ -105,6 +106,11 @@
       </a:defRPr>
     </a:lvl9pPr>
   </p:defaultTextStyle>
+  <p:extLst>
+    <p:ext uri="{EFAFB233-063F-42B5-8137-9DF3F51BA10A}">
+      <p15:sldGuideLst xmlns:p15="http://schemas.microsoft.com/office/powerpoint/2012/main"/>
+    </p:ext>
+  </p:extLst>
 </p:presentation>
 </file>
 
@@ -257,7 +263,7 @@
           <a:p>
             <a:fld id="{FB7DFA09-17F1-475C-8507-1E4FDC8B3CD4}" type="datetimeFigureOut">
               <a:rPr lang="en-GB" smtClean="0"/>
-              <a:t>26/05/2023</a:t>
+              <a:t>29/05/2023</a:t>
             </a:fld>
             <a:endParaRPr lang="en-GB"/>
           </a:p>
@@ -457,7 +463,7 @@
           <a:p>
             <a:fld id="{FB7DFA09-17F1-475C-8507-1E4FDC8B3CD4}" type="datetimeFigureOut">
               <a:rPr lang="en-GB" smtClean="0"/>
-              <a:t>26/05/2023</a:t>
+              <a:t>29/05/2023</a:t>
             </a:fld>
             <a:endParaRPr lang="en-GB"/>
           </a:p>
@@ -667,7 +673,7 @@
           <a:p>
             <a:fld id="{FB7DFA09-17F1-475C-8507-1E4FDC8B3CD4}" type="datetimeFigureOut">
               <a:rPr lang="en-GB" smtClean="0"/>
-              <a:t>26/05/2023</a:t>
+              <a:t>29/05/2023</a:t>
             </a:fld>
             <a:endParaRPr lang="en-GB"/>
           </a:p>
@@ -867,7 +873,7 @@
           <a:p>
             <a:fld id="{FB7DFA09-17F1-475C-8507-1E4FDC8B3CD4}" type="datetimeFigureOut">
               <a:rPr lang="en-GB" smtClean="0"/>
-              <a:t>26/05/2023</a:t>
+              <a:t>29/05/2023</a:t>
             </a:fld>
             <a:endParaRPr lang="en-GB"/>
           </a:p>
@@ -1143,7 +1149,7 @@
           <a:p>
             <a:fld id="{FB7DFA09-17F1-475C-8507-1E4FDC8B3CD4}" type="datetimeFigureOut">
               <a:rPr lang="en-GB" smtClean="0"/>
-              <a:t>26/05/2023</a:t>
+              <a:t>29/05/2023</a:t>
             </a:fld>
             <a:endParaRPr lang="en-GB"/>
           </a:p>
@@ -1411,7 +1417,7 @@
           <a:p>
             <a:fld id="{FB7DFA09-17F1-475C-8507-1E4FDC8B3CD4}" type="datetimeFigureOut">
               <a:rPr lang="en-GB" smtClean="0"/>
-              <a:t>26/05/2023</a:t>
+              <a:t>29/05/2023</a:t>
             </a:fld>
             <a:endParaRPr lang="en-GB"/>
           </a:p>
@@ -1826,7 +1832,7 @@
           <a:p>
             <a:fld id="{FB7DFA09-17F1-475C-8507-1E4FDC8B3CD4}" type="datetimeFigureOut">
               <a:rPr lang="en-GB" smtClean="0"/>
-              <a:t>26/05/2023</a:t>
+              <a:t>29/05/2023</a:t>
             </a:fld>
             <a:endParaRPr lang="en-GB"/>
           </a:p>
@@ -1968,7 +1974,7 @@
           <a:p>
             <a:fld id="{FB7DFA09-17F1-475C-8507-1E4FDC8B3CD4}" type="datetimeFigureOut">
               <a:rPr lang="en-GB" smtClean="0"/>
-              <a:t>26/05/2023</a:t>
+              <a:t>29/05/2023</a:t>
             </a:fld>
             <a:endParaRPr lang="en-GB"/>
           </a:p>
@@ -2081,7 +2087,7 @@
           <a:p>
             <a:fld id="{FB7DFA09-17F1-475C-8507-1E4FDC8B3CD4}" type="datetimeFigureOut">
               <a:rPr lang="en-GB" smtClean="0"/>
-              <a:t>26/05/2023</a:t>
+              <a:t>29/05/2023</a:t>
             </a:fld>
             <a:endParaRPr lang="en-GB"/>
           </a:p>
@@ -2394,7 +2400,7 @@
           <a:p>
             <a:fld id="{FB7DFA09-17F1-475C-8507-1E4FDC8B3CD4}" type="datetimeFigureOut">
               <a:rPr lang="en-GB" smtClean="0"/>
-              <a:t>26/05/2023</a:t>
+              <a:t>29/05/2023</a:t>
             </a:fld>
             <a:endParaRPr lang="en-GB"/>
           </a:p>
@@ -2683,7 +2689,7 @@
           <a:p>
             <a:fld id="{FB7DFA09-17F1-475C-8507-1E4FDC8B3CD4}" type="datetimeFigureOut">
               <a:rPr lang="en-GB" smtClean="0"/>
-              <a:t>26/05/2023</a:t>
+              <a:t>29/05/2023</a:t>
             </a:fld>
             <a:endParaRPr lang="en-GB"/>
           </a:p>
@@ -2926,7 +2932,7 @@
           <a:p>
             <a:fld id="{FB7DFA09-17F1-475C-8507-1E4FDC8B3CD4}" type="datetimeFigureOut">
               <a:rPr lang="en-GB" smtClean="0"/>
-              <a:t>26/05/2023</a:t>
+              <a:t>29/05/2023</a:t>
             </a:fld>
             <a:endParaRPr lang="en-GB"/>
           </a:p>
@@ -4341,6 +4347,3070 @@
 </p:sld>
 </file>
 
+<file path=ppt/slides/slide3.xml><?xml version="1.0" encoding="utf-8"?>
+<p:sld xmlns:a="http://schemas.openxmlformats.org/drawingml/2006/main" xmlns:r="http://schemas.openxmlformats.org/officeDocument/2006/relationships" xmlns:p="http://schemas.openxmlformats.org/presentationml/2006/main">
+  <p:cSld>
+    <p:spTree>
+      <p:nvGrpSpPr>
+        <p:cNvPr id="1" name=""/>
+        <p:cNvGrpSpPr/>
+        <p:nvPr/>
+      </p:nvGrpSpPr>
+      <p:grpSpPr>
+        <a:xfrm>
+          <a:off x="0" y="0"/>
+          <a:ext cx="0" cy="0"/>
+          <a:chOff x="0" y="0"/>
+          <a:chExt cx="0" cy="0"/>
+        </a:xfrm>
+      </p:grpSpPr>
+      <p:sp>
+        <p:nvSpPr>
+          <p:cNvPr id="4" name="Rectangle 3">
+            <a:extLst>
+              <a:ext uri="{FF2B5EF4-FFF2-40B4-BE49-F238E27FC236}">
+                <a16:creationId xmlns:a16="http://schemas.microsoft.com/office/drawing/2014/main" id="{ECF4FD6E-0736-4A39-9651-1F5DD3D63722}"/>
+              </a:ext>
+            </a:extLst>
+          </p:cNvPr>
+          <p:cNvSpPr/>
+          <p:nvPr/>
+        </p:nvSpPr>
+        <p:spPr>
+          <a:xfrm>
+            <a:off x="1482056" y="-24246"/>
+            <a:ext cx="9235682" cy="6905625"/>
+          </a:xfrm>
+          <a:prstGeom prst="rect">
+            <a:avLst/>
+          </a:prstGeom>
+          <a:solidFill>
+            <a:schemeClr val="bg1"/>
+          </a:solidFill>
+        </p:spPr>
+        <p:style>
+          <a:lnRef idx="2">
+            <a:schemeClr val="accent1">
+              <a:shade val="15000"/>
+            </a:schemeClr>
+          </a:lnRef>
+          <a:fillRef idx="1">
+            <a:schemeClr val="accent1"/>
+          </a:fillRef>
+          <a:effectRef idx="0">
+            <a:schemeClr val="accent1"/>
+          </a:effectRef>
+          <a:fontRef idx="minor">
+            <a:schemeClr val="lt1"/>
+          </a:fontRef>
+        </p:style>
+        <p:txBody>
+          <a:bodyPr wrap="square" rtlCol="0" anchor="t" anchorCtr="0"/>
+          <a:lstStyle>
+            <a:lvl1pPr marL="0" indent="0">
+              <a:defRPr sz="1100">
+                <a:solidFill>
+                  <a:schemeClr val="lt1"/>
+                </a:solidFill>
+                <a:latin typeface="+mn-lt"/>
+                <a:ea typeface="+mn-ea"/>
+                <a:cs typeface="+mn-cs"/>
+              </a:defRPr>
+            </a:lvl1pPr>
+            <a:lvl2pPr marL="457200" indent="0">
+              <a:defRPr sz="1100">
+                <a:solidFill>
+                  <a:schemeClr val="lt1"/>
+                </a:solidFill>
+                <a:latin typeface="+mn-lt"/>
+                <a:ea typeface="+mn-ea"/>
+                <a:cs typeface="+mn-cs"/>
+              </a:defRPr>
+            </a:lvl2pPr>
+            <a:lvl3pPr marL="914400" indent="0">
+              <a:defRPr sz="1100">
+                <a:solidFill>
+                  <a:schemeClr val="lt1"/>
+                </a:solidFill>
+                <a:latin typeface="+mn-lt"/>
+                <a:ea typeface="+mn-ea"/>
+                <a:cs typeface="+mn-cs"/>
+              </a:defRPr>
+            </a:lvl3pPr>
+            <a:lvl4pPr marL="1371600" indent="0">
+              <a:defRPr sz="1100">
+                <a:solidFill>
+                  <a:schemeClr val="lt1"/>
+                </a:solidFill>
+                <a:latin typeface="+mn-lt"/>
+                <a:ea typeface="+mn-ea"/>
+                <a:cs typeface="+mn-cs"/>
+              </a:defRPr>
+            </a:lvl4pPr>
+            <a:lvl5pPr marL="1828800" indent="0">
+              <a:defRPr sz="1100">
+                <a:solidFill>
+                  <a:schemeClr val="lt1"/>
+                </a:solidFill>
+                <a:latin typeface="+mn-lt"/>
+                <a:ea typeface="+mn-ea"/>
+                <a:cs typeface="+mn-cs"/>
+              </a:defRPr>
+            </a:lvl5pPr>
+            <a:lvl6pPr marL="2286000" indent="0">
+              <a:defRPr sz="1100">
+                <a:solidFill>
+                  <a:schemeClr val="lt1"/>
+                </a:solidFill>
+                <a:latin typeface="+mn-lt"/>
+                <a:ea typeface="+mn-ea"/>
+                <a:cs typeface="+mn-cs"/>
+              </a:defRPr>
+            </a:lvl6pPr>
+            <a:lvl7pPr marL="2743200" indent="0">
+              <a:defRPr sz="1100">
+                <a:solidFill>
+                  <a:schemeClr val="lt1"/>
+                </a:solidFill>
+                <a:latin typeface="+mn-lt"/>
+                <a:ea typeface="+mn-ea"/>
+                <a:cs typeface="+mn-cs"/>
+              </a:defRPr>
+            </a:lvl7pPr>
+            <a:lvl8pPr marL="3200400" indent="0">
+              <a:defRPr sz="1100">
+                <a:solidFill>
+                  <a:schemeClr val="lt1"/>
+                </a:solidFill>
+                <a:latin typeface="+mn-lt"/>
+                <a:ea typeface="+mn-ea"/>
+                <a:cs typeface="+mn-cs"/>
+              </a:defRPr>
+            </a:lvl8pPr>
+            <a:lvl9pPr marL="3657600" indent="0">
+              <a:defRPr sz="1100">
+                <a:solidFill>
+                  <a:schemeClr val="lt1"/>
+                </a:solidFill>
+                <a:latin typeface="+mn-lt"/>
+                <a:ea typeface="+mn-ea"/>
+                <a:cs typeface="+mn-cs"/>
+              </a:defRPr>
+            </a:lvl9pPr>
+          </a:lstStyle>
+          <a:p>
+            <a:pPr algn="ctr"/>
+            <a:endParaRPr lang="en-GB">
+              <a:solidFill>
+                <a:sysClr val="windowText" lastClr="000000"/>
+              </a:solidFill>
+            </a:endParaRPr>
+          </a:p>
+        </p:txBody>
+      </p:sp>
+      <p:sp>
+        <p:nvSpPr>
+          <p:cNvPr id="5" name="Rectangle 4">
+            <a:extLst>
+              <a:ext uri="{FF2B5EF4-FFF2-40B4-BE49-F238E27FC236}">
+                <a16:creationId xmlns:a16="http://schemas.microsoft.com/office/drawing/2014/main" id="{087EF346-B688-01DF-689B-41DAB5E966F3}"/>
+              </a:ext>
+            </a:extLst>
+          </p:cNvPr>
+          <p:cNvSpPr/>
+          <p:nvPr/>
+        </p:nvSpPr>
+        <p:spPr>
+          <a:xfrm>
+            <a:off x="3761233" y="-24246"/>
+            <a:ext cx="6956505" cy="6905625"/>
+          </a:xfrm>
+          <a:prstGeom prst="rect">
+            <a:avLst/>
+          </a:prstGeom>
+          <a:solidFill>
+            <a:srgbClr val="EDE2F6"/>
+          </a:solidFill>
+        </p:spPr>
+        <p:style>
+          <a:lnRef idx="2">
+            <a:schemeClr val="accent1">
+              <a:shade val="15000"/>
+            </a:schemeClr>
+          </a:lnRef>
+          <a:fillRef idx="1">
+            <a:schemeClr val="accent1"/>
+          </a:fillRef>
+          <a:effectRef idx="0">
+            <a:schemeClr val="accent1"/>
+          </a:effectRef>
+          <a:fontRef idx="minor">
+            <a:schemeClr val="lt1"/>
+          </a:fontRef>
+        </p:style>
+        <p:txBody>
+          <a:bodyPr wrap="square" rtlCol="0" anchor="t" anchorCtr="0"/>
+          <a:lstStyle>
+            <a:lvl1pPr marL="0" indent="0">
+              <a:defRPr sz="1100">
+                <a:solidFill>
+                  <a:schemeClr val="lt1"/>
+                </a:solidFill>
+                <a:latin typeface="+mn-lt"/>
+                <a:ea typeface="+mn-ea"/>
+                <a:cs typeface="+mn-cs"/>
+              </a:defRPr>
+            </a:lvl1pPr>
+            <a:lvl2pPr marL="457200" indent="0">
+              <a:defRPr sz="1100">
+                <a:solidFill>
+                  <a:schemeClr val="lt1"/>
+                </a:solidFill>
+                <a:latin typeface="+mn-lt"/>
+                <a:ea typeface="+mn-ea"/>
+                <a:cs typeface="+mn-cs"/>
+              </a:defRPr>
+            </a:lvl2pPr>
+            <a:lvl3pPr marL="914400" indent="0">
+              <a:defRPr sz="1100">
+                <a:solidFill>
+                  <a:schemeClr val="lt1"/>
+                </a:solidFill>
+                <a:latin typeface="+mn-lt"/>
+                <a:ea typeface="+mn-ea"/>
+                <a:cs typeface="+mn-cs"/>
+              </a:defRPr>
+            </a:lvl3pPr>
+            <a:lvl4pPr marL="1371600" indent="0">
+              <a:defRPr sz="1100">
+                <a:solidFill>
+                  <a:schemeClr val="lt1"/>
+                </a:solidFill>
+                <a:latin typeface="+mn-lt"/>
+                <a:ea typeface="+mn-ea"/>
+                <a:cs typeface="+mn-cs"/>
+              </a:defRPr>
+            </a:lvl4pPr>
+            <a:lvl5pPr marL="1828800" indent="0">
+              <a:defRPr sz="1100">
+                <a:solidFill>
+                  <a:schemeClr val="lt1"/>
+                </a:solidFill>
+                <a:latin typeface="+mn-lt"/>
+                <a:ea typeface="+mn-ea"/>
+                <a:cs typeface="+mn-cs"/>
+              </a:defRPr>
+            </a:lvl5pPr>
+            <a:lvl6pPr marL="2286000" indent="0">
+              <a:defRPr sz="1100">
+                <a:solidFill>
+                  <a:schemeClr val="lt1"/>
+                </a:solidFill>
+                <a:latin typeface="+mn-lt"/>
+                <a:ea typeface="+mn-ea"/>
+                <a:cs typeface="+mn-cs"/>
+              </a:defRPr>
+            </a:lvl6pPr>
+            <a:lvl7pPr marL="2743200" indent="0">
+              <a:defRPr sz="1100">
+                <a:solidFill>
+                  <a:schemeClr val="lt1"/>
+                </a:solidFill>
+                <a:latin typeface="+mn-lt"/>
+                <a:ea typeface="+mn-ea"/>
+                <a:cs typeface="+mn-cs"/>
+              </a:defRPr>
+            </a:lvl7pPr>
+            <a:lvl8pPr marL="3200400" indent="0">
+              <a:defRPr sz="1100">
+                <a:solidFill>
+                  <a:schemeClr val="lt1"/>
+                </a:solidFill>
+                <a:latin typeface="+mn-lt"/>
+                <a:ea typeface="+mn-ea"/>
+                <a:cs typeface="+mn-cs"/>
+              </a:defRPr>
+            </a:lvl8pPr>
+            <a:lvl9pPr marL="3657600" indent="0">
+              <a:defRPr sz="1100">
+                <a:solidFill>
+                  <a:schemeClr val="lt1"/>
+                </a:solidFill>
+                <a:latin typeface="+mn-lt"/>
+                <a:ea typeface="+mn-ea"/>
+                <a:cs typeface="+mn-cs"/>
+              </a:defRPr>
+            </a:lvl9pPr>
+          </a:lstStyle>
+          <a:p>
+            <a:pPr algn="ctr"/>
+            <a:r>
+              <a:rPr lang="en-GB">
+                <a:solidFill>
+                  <a:sysClr val="windowText" lastClr="000000"/>
+                </a:solidFill>
+              </a:rPr>
+              <a:t>Spreadsheet Extractor</a:t>
+            </a:r>
+          </a:p>
+        </p:txBody>
+      </p:sp>
+      <p:sp>
+        <p:nvSpPr>
+          <p:cNvPr id="6" name="Rectangle 5">
+            <a:extLst>
+              <a:ext uri="{FF2B5EF4-FFF2-40B4-BE49-F238E27FC236}">
+                <a16:creationId xmlns:a16="http://schemas.microsoft.com/office/drawing/2014/main" id="{0B999926-F683-6A9F-BD0B-D73169E257D5}"/>
+              </a:ext>
+            </a:extLst>
+          </p:cNvPr>
+          <p:cNvSpPr/>
+          <p:nvPr/>
+        </p:nvSpPr>
+        <p:spPr>
+          <a:xfrm>
+            <a:off x="1482056" y="-24246"/>
+            <a:ext cx="2001289" cy="6905625"/>
+          </a:xfrm>
+          <a:prstGeom prst="rect">
+            <a:avLst/>
+          </a:prstGeom>
+          <a:solidFill>
+            <a:schemeClr val="bg1">
+              <a:lumMod val="95000"/>
+            </a:schemeClr>
+          </a:solidFill>
+        </p:spPr>
+        <p:style>
+          <a:lnRef idx="2">
+            <a:schemeClr val="accent1">
+              <a:shade val="15000"/>
+            </a:schemeClr>
+          </a:lnRef>
+          <a:fillRef idx="1">
+            <a:schemeClr val="accent1"/>
+          </a:fillRef>
+          <a:effectRef idx="0">
+            <a:schemeClr val="accent1"/>
+          </a:effectRef>
+          <a:fontRef idx="minor">
+            <a:schemeClr val="lt1"/>
+          </a:fontRef>
+        </p:style>
+        <p:txBody>
+          <a:bodyPr wrap="square" rtlCol="0" anchor="t" anchorCtr="0"/>
+          <a:lstStyle>
+            <a:lvl1pPr marL="0" indent="0">
+              <a:defRPr sz="1100">
+                <a:solidFill>
+                  <a:schemeClr val="lt1"/>
+                </a:solidFill>
+                <a:latin typeface="+mn-lt"/>
+                <a:ea typeface="+mn-ea"/>
+                <a:cs typeface="+mn-cs"/>
+              </a:defRPr>
+            </a:lvl1pPr>
+            <a:lvl2pPr marL="457200" indent="0">
+              <a:defRPr sz="1100">
+                <a:solidFill>
+                  <a:schemeClr val="lt1"/>
+                </a:solidFill>
+                <a:latin typeface="+mn-lt"/>
+                <a:ea typeface="+mn-ea"/>
+                <a:cs typeface="+mn-cs"/>
+              </a:defRPr>
+            </a:lvl2pPr>
+            <a:lvl3pPr marL="914400" indent="0">
+              <a:defRPr sz="1100">
+                <a:solidFill>
+                  <a:schemeClr val="lt1"/>
+                </a:solidFill>
+                <a:latin typeface="+mn-lt"/>
+                <a:ea typeface="+mn-ea"/>
+                <a:cs typeface="+mn-cs"/>
+              </a:defRPr>
+            </a:lvl3pPr>
+            <a:lvl4pPr marL="1371600" indent="0">
+              <a:defRPr sz="1100">
+                <a:solidFill>
+                  <a:schemeClr val="lt1"/>
+                </a:solidFill>
+                <a:latin typeface="+mn-lt"/>
+                <a:ea typeface="+mn-ea"/>
+                <a:cs typeface="+mn-cs"/>
+              </a:defRPr>
+            </a:lvl4pPr>
+            <a:lvl5pPr marL="1828800" indent="0">
+              <a:defRPr sz="1100">
+                <a:solidFill>
+                  <a:schemeClr val="lt1"/>
+                </a:solidFill>
+                <a:latin typeface="+mn-lt"/>
+                <a:ea typeface="+mn-ea"/>
+                <a:cs typeface="+mn-cs"/>
+              </a:defRPr>
+            </a:lvl5pPr>
+            <a:lvl6pPr marL="2286000" indent="0">
+              <a:defRPr sz="1100">
+                <a:solidFill>
+                  <a:schemeClr val="lt1"/>
+                </a:solidFill>
+                <a:latin typeface="+mn-lt"/>
+                <a:ea typeface="+mn-ea"/>
+                <a:cs typeface="+mn-cs"/>
+              </a:defRPr>
+            </a:lvl6pPr>
+            <a:lvl7pPr marL="2743200" indent="0">
+              <a:defRPr sz="1100">
+                <a:solidFill>
+                  <a:schemeClr val="lt1"/>
+                </a:solidFill>
+                <a:latin typeface="+mn-lt"/>
+                <a:ea typeface="+mn-ea"/>
+                <a:cs typeface="+mn-cs"/>
+              </a:defRPr>
+            </a:lvl7pPr>
+            <a:lvl8pPr marL="3200400" indent="0">
+              <a:defRPr sz="1100">
+                <a:solidFill>
+                  <a:schemeClr val="lt1"/>
+                </a:solidFill>
+                <a:latin typeface="+mn-lt"/>
+                <a:ea typeface="+mn-ea"/>
+                <a:cs typeface="+mn-cs"/>
+              </a:defRPr>
+            </a:lvl8pPr>
+            <a:lvl9pPr marL="3657600" indent="0">
+              <a:defRPr sz="1100">
+                <a:solidFill>
+                  <a:schemeClr val="lt1"/>
+                </a:solidFill>
+                <a:latin typeface="+mn-lt"/>
+                <a:ea typeface="+mn-ea"/>
+                <a:cs typeface="+mn-cs"/>
+              </a:defRPr>
+            </a:lvl9pPr>
+          </a:lstStyle>
+          <a:p>
+            <a:pPr algn="ctr"/>
+            <a:r>
+              <a:rPr lang="en-GB">
+                <a:solidFill>
+                  <a:sysClr val="windowText" lastClr="000000"/>
+                </a:solidFill>
+              </a:rPr>
+              <a:t>Base Libraries</a:t>
+            </a:r>
+          </a:p>
+        </p:txBody>
+      </p:sp>
+      <p:sp>
+        <p:nvSpPr>
+          <p:cNvPr id="7" name="Rectangle 6">
+            <a:extLst>
+              <a:ext uri="{FF2B5EF4-FFF2-40B4-BE49-F238E27FC236}">
+                <a16:creationId xmlns:a16="http://schemas.microsoft.com/office/drawing/2014/main" id="{03EE906F-1BB0-E2F3-1BF0-A87DDAE2FDF1}"/>
+              </a:ext>
+            </a:extLst>
+          </p:cNvPr>
+          <p:cNvSpPr/>
+          <p:nvPr/>
+        </p:nvSpPr>
+        <p:spPr>
+          <a:xfrm>
+            <a:off x="1608665" y="1319725"/>
+            <a:ext cx="1748071" cy="464234"/>
+          </a:xfrm>
+          <a:prstGeom prst="rect">
+            <a:avLst/>
+          </a:prstGeom>
+          <a:solidFill>
+            <a:schemeClr val="tx1">
+              <a:lumMod val="50000"/>
+              <a:lumOff val="50000"/>
+            </a:schemeClr>
+          </a:solidFill>
+        </p:spPr>
+        <p:style>
+          <a:lnRef idx="2">
+            <a:schemeClr val="accent1">
+              <a:shade val="15000"/>
+            </a:schemeClr>
+          </a:lnRef>
+          <a:fillRef idx="1">
+            <a:schemeClr val="accent1"/>
+          </a:fillRef>
+          <a:effectRef idx="0">
+            <a:schemeClr val="accent1"/>
+          </a:effectRef>
+          <a:fontRef idx="minor">
+            <a:schemeClr val="lt1"/>
+          </a:fontRef>
+        </p:style>
+        <p:txBody>
+          <a:bodyPr wrap="square" rtlCol="0" anchor="ctr"/>
+          <a:lstStyle>
+            <a:lvl1pPr marL="0" indent="0">
+              <a:defRPr sz="1100">
+                <a:solidFill>
+                  <a:schemeClr val="lt1"/>
+                </a:solidFill>
+                <a:latin typeface="+mn-lt"/>
+                <a:ea typeface="+mn-ea"/>
+                <a:cs typeface="+mn-cs"/>
+              </a:defRPr>
+            </a:lvl1pPr>
+            <a:lvl2pPr marL="457200" indent="0">
+              <a:defRPr sz="1100">
+                <a:solidFill>
+                  <a:schemeClr val="lt1"/>
+                </a:solidFill>
+                <a:latin typeface="+mn-lt"/>
+                <a:ea typeface="+mn-ea"/>
+                <a:cs typeface="+mn-cs"/>
+              </a:defRPr>
+            </a:lvl2pPr>
+            <a:lvl3pPr marL="914400" indent="0">
+              <a:defRPr sz="1100">
+                <a:solidFill>
+                  <a:schemeClr val="lt1"/>
+                </a:solidFill>
+                <a:latin typeface="+mn-lt"/>
+                <a:ea typeface="+mn-ea"/>
+                <a:cs typeface="+mn-cs"/>
+              </a:defRPr>
+            </a:lvl3pPr>
+            <a:lvl4pPr marL="1371600" indent="0">
+              <a:defRPr sz="1100">
+                <a:solidFill>
+                  <a:schemeClr val="lt1"/>
+                </a:solidFill>
+                <a:latin typeface="+mn-lt"/>
+                <a:ea typeface="+mn-ea"/>
+                <a:cs typeface="+mn-cs"/>
+              </a:defRPr>
+            </a:lvl4pPr>
+            <a:lvl5pPr marL="1828800" indent="0">
+              <a:defRPr sz="1100">
+                <a:solidFill>
+                  <a:schemeClr val="lt1"/>
+                </a:solidFill>
+                <a:latin typeface="+mn-lt"/>
+                <a:ea typeface="+mn-ea"/>
+                <a:cs typeface="+mn-cs"/>
+              </a:defRPr>
+            </a:lvl5pPr>
+            <a:lvl6pPr marL="2286000" indent="0">
+              <a:defRPr sz="1100">
+                <a:solidFill>
+                  <a:schemeClr val="lt1"/>
+                </a:solidFill>
+                <a:latin typeface="+mn-lt"/>
+                <a:ea typeface="+mn-ea"/>
+                <a:cs typeface="+mn-cs"/>
+              </a:defRPr>
+            </a:lvl6pPr>
+            <a:lvl7pPr marL="2743200" indent="0">
+              <a:defRPr sz="1100">
+                <a:solidFill>
+                  <a:schemeClr val="lt1"/>
+                </a:solidFill>
+                <a:latin typeface="+mn-lt"/>
+                <a:ea typeface="+mn-ea"/>
+                <a:cs typeface="+mn-cs"/>
+              </a:defRPr>
+            </a:lvl7pPr>
+            <a:lvl8pPr marL="3200400" indent="0">
+              <a:defRPr sz="1100">
+                <a:solidFill>
+                  <a:schemeClr val="lt1"/>
+                </a:solidFill>
+                <a:latin typeface="+mn-lt"/>
+                <a:ea typeface="+mn-ea"/>
+                <a:cs typeface="+mn-cs"/>
+              </a:defRPr>
+            </a:lvl8pPr>
+            <a:lvl9pPr marL="3657600" indent="0">
+              <a:defRPr sz="1100">
+                <a:solidFill>
+                  <a:schemeClr val="lt1"/>
+                </a:solidFill>
+                <a:latin typeface="+mn-lt"/>
+                <a:ea typeface="+mn-ea"/>
+                <a:cs typeface="+mn-cs"/>
+              </a:defRPr>
+            </a:lvl9pPr>
+          </a:lstStyle>
+          <a:p>
+            <a:pPr algn="ctr"/>
+            <a:r>
+              <a:rPr lang="en-GB"/>
+              <a:t>stdArray</a:t>
+            </a:r>
+          </a:p>
+        </p:txBody>
+      </p:sp>
+      <p:sp>
+        <p:nvSpPr>
+          <p:cNvPr id="8" name="Rectangle 7">
+            <a:extLst>
+              <a:ext uri="{FF2B5EF4-FFF2-40B4-BE49-F238E27FC236}">
+                <a16:creationId xmlns:a16="http://schemas.microsoft.com/office/drawing/2014/main" id="{3C8A401F-16B8-2BA8-9B5B-01B404F07A08}"/>
+              </a:ext>
+            </a:extLst>
+          </p:cNvPr>
+          <p:cNvSpPr/>
+          <p:nvPr/>
+        </p:nvSpPr>
+        <p:spPr>
+          <a:xfrm>
+            <a:off x="1608665" y="2886516"/>
+            <a:ext cx="1748071" cy="464234"/>
+          </a:xfrm>
+          <a:prstGeom prst="rect">
+            <a:avLst/>
+          </a:prstGeom>
+          <a:solidFill>
+            <a:schemeClr val="tx1">
+              <a:lumMod val="50000"/>
+              <a:lumOff val="50000"/>
+            </a:schemeClr>
+          </a:solidFill>
+        </p:spPr>
+        <p:style>
+          <a:lnRef idx="2">
+            <a:schemeClr val="accent1">
+              <a:shade val="15000"/>
+            </a:schemeClr>
+          </a:lnRef>
+          <a:fillRef idx="1">
+            <a:schemeClr val="accent1"/>
+          </a:fillRef>
+          <a:effectRef idx="0">
+            <a:schemeClr val="accent1"/>
+          </a:effectRef>
+          <a:fontRef idx="minor">
+            <a:schemeClr val="lt1"/>
+          </a:fontRef>
+        </p:style>
+        <p:txBody>
+          <a:bodyPr wrap="square" rtlCol="0" anchor="ctr"/>
+          <a:lstStyle>
+            <a:lvl1pPr marL="0" indent="0">
+              <a:defRPr sz="1100">
+                <a:solidFill>
+                  <a:schemeClr val="lt1"/>
+                </a:solidFill>
+                <a:latin typeface="+mn-lt"/>
+                <a:ea typeface="+mn-ea"/>
+                <a:cs typeface="+mn-cs"/>
+              </a:defRPr>
+            </a:lvl1pPr>
+            <a:lvl2pPr marL="457200" indent="0">
+              <a:defRPr sz="1100">
+                <a:solidFill>
+                  <a:schemeClr val="lt1"/>
+                </a:solidFill>
+                <a:latin typeface="+mn-lt"/>
+                <a:ea typeface="+mn-ea"/>
+                <a:cs typeface="+mn-cs"/>
+              </a:defRPr>
+            </a:lvl2pPr>
+            <a:lvl3pPr marL="914400" indent="0">
+              <a:defRPr sz="1100">
+                <a:solidFill>
+                  <a:schemeClr val="lt1"/>
+                </a:solidFill>
+                <a:latin typeface="+mn-lt"/>
+                <a:ea typeface="+mn-ea"/>
+                <a:cs typeface="+mn-cs"/>
+              </a:defRPr>
+            </a:lvl3pPr>
+            <a:lvl4pPr marL="1371600" indent="0">
+              <a:defRPr sz="1100">
+                <a:solidFill>
+                  <a:schemeClr val="lt1"/>
+                </a:solidFill>
+                <a:latin typeface="+mn-lt"/>
+                <a:ea typeface="+mn-ea"/>
+                <a:cs typeface="+mn-cs"/>
+              </a:defRPr>
+            </a:lvl4pPr>
+            <a:lvl5pPr marL="1828800" indent="0">
+              <a:defRPr sz="1100">
+                <a:solidFill>
+                  <a:schemeClr val="lt1"/>
+                </a:solidFill>
+                <a:latin typeface="+mn-lt"/>
+                <a:ea typeface="+mn-ea"/>
+                <a:cs typeface="+mn-cs"/>
+              </a:defRPr>
+            </a:lvl5pPr>
+            <a:lvl6pPr marL="2286000" indent="0">
+              <a:defRPr sz="1100">
+                <a:solidFill>
+                  <a:schemeClr val="lt1"/>
+                </a:solidFill>
+                <a:latin typeface="+mn-lt"/>
+                <a:ea typeface="+mn-ea"/>
+                <a:cs typeface="+mn-cs"/>
+              </a:defRPr>
+            </a:lvl6pPr>
+            <a:lvl7pPr marL="2743200" indent="0">
+              <a:defRPr sz="1100">
+                <a:solidFill>
+                  <a:schemeClr val="lt1"/>
+                </a:solidFill>
+                <a:latin typeface="+mn-lt"/>
+                <a:ea typeface="+mn-ea"/>
+                <a:cs typeface="+mn-cs"/>
+              </a:defRPr>
+            </a:lvl7pPr>
+            <a:lvl8pPr marL="3200400" indent="0">
+              <a:defRPr sz="1100">
+                <a:solidFill>
+                  <a:schemeClr val="lt1"/>
+                </a:solidFill>
+                <a:latin typeface="+mn-lt"/>
+                <a:ea typeface="+mn-ea"/>
+                <a:cs typeface="+mn-cs"/>
+              </a:defRPr>
+            </a:lvl8pPr>
+            <a:lvl9pPr marL="3657600" indent="0">
+              <a:defRPr sz="1100">
+                <a:solidFill>
+                  <a:schemeClr val="lt1"/>
+                </a:solidFill>
+                <a:latin typeface="+mn-lt"/>
+                <a:ea typeface="+mn-ea"/>
+                <a:cs typeface="+mn-cs"/>
+              </a:defRPr>
+            </a:lvl9pPr>
+          </a:lstStyle>
+          <a:p>
+            <a:pPr algn="ctr"/>
+            <a:r>
+              <a:rPr lang="en-GB"/>
+              <a:t>stdCallback</a:t>
+            </a:r>
+          </a:p>
+        </p:txBody>
+      </p:sp>
+      <p:sp>
+        <p:nvSpPr>
+          <p:cNvPr id="9" name="Rectangle 8">
+            <a:extLst>
+              <a:ext uri="{FF2B5EF4-FFF2-40B4-BE49-F238E27FC236}">
+                <a16:creationId xmlns:a16="http://schemas.microsoft.com/office/drawing/2014/main" id="{0FEFD7CC-8EA2-DDD2-07E1-0107F04DA2A3}"/>
+              </a:ext>
+            </a:extLst>
+          </p:cNvPr>
+          <p:cNvSpPr/>
+          <p:nvPr/>
+        </p:nvSpPr>
+        <p:spPr>
+          <a:xfrm>
+            <a:off x="1608665" y="3463292"/>
+            <a:ext cx="1748071" cy="464234"/>
+          </a:xfrm>
+          <a:prstGeom prst="rect">
+            <a:avLst/>
+          </a:prstGeom>
+          <a:solidFill>
+            <a:schemeClr val="tx1">
+              <a:lumMod val="50000"/>
+              <a:lumOff val="50000"/>
+            </a:schemeClr>
+          </a:solidFill>
+        </p:spPr>
+        <p:style>
+          <a:lnRef idx="2">
+            <a:schemeClr val="accent1">
+              <a:shade val="15000"/>
+            </a:schemeClr>
+          </a:lnRef>
+          <a:fillRef idx="1">
+            <a:schemeClr val="accent1"/>
+          </a:fillRef>
+          <a:effectRef idx="0">
+            <a:schemeClr val="accent1"/>
+          </a:effectRef>
+          <a:fontRef idx="minor">
+            <a:schemeClr val="lt1"/>
+          </a:fontRef>
+        </p:style>
+        <p:txBody>
+          <a:bodyPr wrap="square" rtlCol="0" anchor="ctr"/>
+          <a:lstStyle>
+            <a:lvl1pPr marL="0" indent="0">
+              <a:defRPr sz="1100">
+                <a:solidFill>
+                  <a:schemeClr val="lt1"/>
+                </a:solidFill>
+                <a:latin typeface="+mn-lt"/>
+                <a:ea typeface="+mn-ea"/>
+                <a:cs typeface="+mn-cs"/>
+              </a:defRPr>
+            </a:lvl1pPr>
+            <a:lvl2pPr marL="457200" indent="0">
+              <a:defRPr sz="1100">
+                <a:solidFill>
+                  <a:schemeClr val="lt1"/>
+                </a:solidFill>
+                <a:latin typeface="+mn-lt"/>
+                <a:ea typeface="+mn-ea"/>
+                <a:cs typeface="+mn-cs"/>
+              </a:defRPr>
+            </a:lvl2pPr>
+            <a:lvl3pPr marL="914400" indent="0">
+              <a:defRPr sz="1100">
+                <a:solidFill>
+                  <a:schemeClr val="lt1"/>
+                </a:solidFill>
+                <a:latin typeface="+mn-lt"/>
+                <a:ea typeface="+mn-ea"/>
+                <a:cs typeface="+mn-cs"/>
+              </a:defRPr>
+            </a:lvl3pPr>
+            <a:lvl4pPr marL="1371600" indent="0">
+              <a:defRPr sz="1100">
+                <a:solidFill>
+                  <a:schemeClr val="lt1"/>
+                </a:solidFill>
+                <a:latin typeface="+mn-lt"/>
+                <a:ea typeface="+mn-ea"/>
+                <a:cs typeface="+mn-cs"/>
+              </a:defRPr>
+            </a:lvl4pPr>
+            <a:lvl5pPr marL="1828800" indent="0">
+              <a:defRPr sz="1100">
+                <a:solidFill>
+                  <a:schemeClr val="lt1"/>
+                </a:solidFill>
+                <a:latin typeface="+mn-lt"/>
+                <a:ea typeface="+mn-ea"/>
+                <a:cs typeface="+mn-cs"/>
+              </a:defRPr>
+            </a:lvl5pPr>
+            <a:lvl6pPr marL="2286000" indent="0">
+              <a:defRPr sz="1100">
+                <a:solidFill>
+                  <a:schemeClr val="lt1"/>
+                </a:solidFill>
+                <a:latin typeface="+mn-lt"/>
+                <a:ea typeface="+mn-ea"/>
+                <a:cs typeface="+mn-cs"/>
+              </a:defRPr>
+            </a:lvl6pPr>
+            <a:lvl7pPr marL="2743200" indent="0">
+              <a:defRPr sz="1100">
+                <a:solidFill>
+                  <a:schemeClr val="lt1"/>
+                </a:solidFill>
+                <a:latin typeface="+mn-lt"/>
+                <a:ea typeface="+mn-ea"/>
+                <a:cs typeface="+mn-cs"/>
+              </a:defRPr>
+            </a:lvl7pPr>
+            <a:lvl8pPr marL="3200400" indent="0">
+              <a:defRPr sz="1100">
+                <a:solidFill>
+                  <a:schemeClr val="lt1"/>
+                </a:solidFill>
+                <a:latin typeface="+mn-lt"/>
+                <a:ea typeface="+mn-ea"/>
+                <a:cs typeface="+mn-cs"/>
+              </a:defRPr>
+            </a:lvl8pPr>
+            <a:lvl9pPr marL="3657600" indent="0">
+              <a:defRPr sz="1100">
+                <a:solidFill>
+                  <a:schemeClr val="lt1"/>
+                </a:solidFill>
+                <a:latin typeface="+mn-lt"/>
+                <a:ea typeface="+mn-ea"/>
+                <a:cs typeface="+mn-cs"/>
+              </a:defRPr>
+            </a:lvl9pPr>
+          </a:lstStyle>
+          <a:p>
+            <a:pPr algn="ctr"/>
+            <a:r>
+              <a:rPr lang="en-GB"/>
+              <a:t>stdCOM</a:t>
+            </a:r>
+          </a:p>
+        </p:txBody>
+      </p:sp>
+      <p:sp>
+        <p:nvSpPr>
+          <p:cNvPr id="10" name="Rectangle 9">
+            <a:extLst>
+              <a:ext uri="{FF2B5EF4-FFF2-40B4-BE49-F238E27FC236}">
+                <a16:creationId xmlns:a16="http://schemas.microsoft.com/office/drawing/2014/main" id="{72482F3B-4060-5224-D54F-A53017B3ED73}"/>
+              </a:ext>
+            </a:extLst>
+          </p:cNvPr>
+          <p:cNvSpPr/>
+          <p:nvPr/>
+        </p:nvSpPr>
+        <p:spPr>
+          <a:xfrm>
+            <a:off x="1608665" y="785152"/>
+            <a:ext cx="1748071" cy="464234"/>
+          </a:xfrm>
+          <a:prstGeom prst="rect">
+            <a:avLst/>
+          </a:prstGeom>
+          <a:solidFill>
+            <a:schemeClr val="tx1">
+              <a:lumMod val="50000"/>
+              <a:lumOff val="50000"/>
+            </a:schemeClr>
+          </a:solidFill>
+        </p:spPr>
+        <p:style>
+          <a:lnRef idx="2">
+            <a:schemeClr val="accent1">
+              <a:shade val="15000"/>
+            </a:schemeClr>
+          </a:lnRef>
+          <a:fillRef idx="1">
+            <a:schemeClr val="accent1"/>
+          </a:fillRef>
+          <a:effectRef idx="0">
+            <a:schemeClr val="accent1"/>
+          </a:effectRef>
+          <a:fontRef idx="minor">
+            <a:schemeClr val="lt1"/>
+          </a:fontRef>
+        </p:style>
+        <p:txBody>
+          <a:bodyPr wrap="square" rtlCol="0" anchor="ctr"/>
+          <a:lstStyle>
+            <a:lvl1pPr marL="0" indent="0">
+              <a:defRPr sz="1100">
+                <a:solidFill>
+                  <a:schemeClr val="lt1"/>
+                </a:solidFill>
+                <a:latin typeface="+mn-lt"/>
+                <a:ea typeface="+mn-ea"/>
+                <a:cs typeface="+mn-cs"/>
+              </a:defRPr>
+            </a:lvl1pPr>
+            <a:lvl2pPr marL="457200" indent="0">
+              <a:defRPr sz="1100">
+                <a:solidFill>
+                  <a:schemeClr val="lt1"/>
+                </a:solidFill>
+                <a:latin typeface="+mn-lt"/>
+                <a:ea typeface="+mn-ea"/>
+                <a:cs typeface="+mn-cs"/>
+              </a:defRPr>
+            </a:lvl2pPr>
+            <a:lvl3pPr marL="914400" indent="0">
+              <a:defRPr sz="1100">
+                <a:solidFill>
+                  <a:schemeClr val="lt1"/>
+                </a:solidFill>
+                <a:latin typeface="+mn-lt"/>
+                <a:ea typeface="+mn-ea"/>
+                <a:cs typeface="+mn-cs"/>
+              </a:defRPr>
+            </a:lvl3pPr>
+            <a:lvl4pPr marL="1371600" indent="0">
+              <a:defRPr sz="1100">
+                <a:solidFill>
+                  <a:schemeClr val="lt1"/>
+                </a:solidFill>
+                <a:latin typeface="+mn-lt"/>
+                <a:ea typeface="+mn-ea"/>
+                <a:cs typeface="+mn-cs"/>
+              </a:defRPr>
+            </a:lvl4pPr>
+            <a:lvl5pPr marL="1828800" indent="0">
+              <a:defRPr sz="1100">
+                <a:solidFill>
+                  <a:schemeClr val="lt1"/>
+                </a:solidFill>
+                <a:latin typeface="+mn-lt"/>
+                <a:ea typeface="+mn-ea"/>
+                <a:cs typeface="+mn-cs"/>
+              </a:defRPr>
+            </a:lvl5pPr>
+            <a:lvl6pPr marL="2286000" indent="0">
+              <a:defRPr sz="1100">
+                <a:solidFill>
+                  <a:schemeClr val="lt1"/>
+                </a:solidFill>
+                <a:latin typeface="+mn-lt"/>
+                <a:ea typeface="+mn-ea"/>
+                <a:cs typeface="+mn-cs"/>
+              </a:defRPr>
+            </a:lvl6pPr>
+            <a:lvl7pPr marL="2743200" indent="0">
+              <a:defRPr sz="1100">
+                <a:solidFill>
+                  <a:schemeClr val="lt1"/>
+                </a:solidFill>
+                <a:latin typeface="+mn-lt"/>
+                <a:ea typeface="+mn-ea"/>
+                <a:cs typeface="+mn-cs"/>
+              </a:defRPr>
+            </a:lvl7pPr>
+            <a:lvl8pPr marL="3200400" indent="0">
+              <a:defRPr sz="1100">
+                <a:solidFill>
+                  <a:schemeClr val="lt1"/>
+                </a:solidFill>
+                <a:latin typeface="+mn-lt"/>
+                <a:ea typeface="+mn-ea"/>
+                <a:cs typeface="+mn-cs"/>
+              </a:defRPr>
+            </a:lvl8pPr>
+            <a:lvl9pPr marL="3657600" indent="0">
+              <a:defRPr sz="1100">
+                <a:solidFill>
+                  <a:schemeClr val="lt1"/>
+                </a:solidFill>
+                <a:latin typeface="+mn-lt"/>
+                <a:ea typeface="+mn-ea"/>
+                <a:cs typeface="+mn-cs"/>
+              </a:defRPr>
+            </a:lvl9pPr>
+          </a:lstStyle>
+          <a:p>
+            <a:pPr algn="ctr"/>
+            <a:r>
+              <a:rPr lang="en-GB"/>
+              <a:t>stdEnumerator</a:t>
+            </a:r>
+          </a:p>
+        </p:txBody>
+      </p:sp>
+      <p:sp>
+        <p:nvSpPr>
+          <p:cNvPr id="11" name="Rectangle 10">
+            <a:extLst>
+              <a:ext uri="{FF2B5EF4-FFF2-40B4-BE49-F238E27FC236}">
+                <a16:creationId xmlns:a16="http://schemas.microsoft.com/office/drawing/2014/main" id="{B59A2648-F789-C882-553F-107FFFADD916}"/>
+              </a:ext>
+            </a:extLst>
+          </p:cNvPr>
+          <p:cNvSpPr/>
+          <p:nvPr/>
+        </p:nvSpPr>
+        <p:spPr>
+          <a:xfrm>
+            <a:off x="1608665" y="4043584"/>
+            <a:ext cx="1748071" cy="464234"/>
+          </a:xfrm>
+          <a:prstGeom prst="rect">
+            <a:avLst/>
+          </a:prstGeom>
+          <a:solidFill>
+            <a:schemeClr val="tx1">
+              <a:lumMod val="50000"/>
+              <a:lumOff val="50000"/>
+            </a:schemeClr>
+          </a:solidFill>
+        </p:spPr>
+        <p:style>
+          <a:lnRef idx="2">
+            <a:schemeClr val="accent1">
+              <a:shade val="15000"/>
+            </a:schemeClr>
+          </a:lnRef>
+          <a:fillRef idx="1">
+            <a:schemeClr val="accent1"/>
+          </a:fillRef>
+          <a:effectRef idx="0">
+            <a:schemeClr val="accent1"/>
+          </a:effectRef>
+          <a:fontRef idx="minor">
+            <a:schemeClr val="lt1"/>
+          </a:fontRef>
+        </p:style>
+        <p:txBody>
+          <a:bodyPr wrap="square" rtlCol="0" anchor="ctr"/>
+          <a:lstStyle>
+            <a:lvl1pPr marL="0" indent="0">
+              <a:defRPr sz="1100">
+                <a:solidFill>
+                  <a:schemeClr val="lt1"/>
+                </a:solidFill>
+                <a:latin typeface="+mn-lt"/>
+                <a:ea typeface="+mn-ea"/>
+                <a:cs typeface="+mn-cs"/>
+              </a:defRPr>
+            </a:lvl1pPr>
+            <a:lvl2pPr marL="457200" indent="0">
+              <a:defRPr sz="1100">
+                <a:solidFill>
+                  <a:schemeClr val="lt1"/>
+                </a:solidFill>
+                <a:latin typeface="+mn-lt"/>
+                <a:ea typeface="+mn-ea"/>
+                <a:cs typeface="+mn-cs"/>
+              </a:defRPr>
+            </a:lvl2pPr>
+            <a:lvl3pPr marL="914400" indent="0">
+              <a:defRPr sz="1100">
+                <a:solidFill>
+                  <a:schemeClr val="lt1"/>
+                </a:solidFill>
+                <a:latin typeface="+mn-lt"/>
+                <a:ea typeface="+mn-ea"/>
+                <a:cs typeface="+mn-cs"/>
+              </a:defRPr>
+            </a:lvl3pPr>
+            <a:lvl4pPr marL="1371600" indent="0">
+              <a:defRPr sz="1100">
+                <a:solidFill>
+                  <a:schemeClr val="lt1"/>
+                </a:solidFill>
+                <a:latin typeface="+mn-lt"/>
+                <a:ea typeface="+mn-ea"/>
+                <a:cs typeface="+mn-cs"/>
+              </a:defRPr>
+            </a:lvl4pPr>
+            <a:lvl5pPr marL="1828800" indent="0">
+              <a:defRPr sz="1100">
+                <a:solidFill>
+                  <a:schemeClr val="lt1"/>
+                </a:solidFill>
+                <a:latin typeface="+mn-lt"/>
+                <a:ea typeface="+mn-ea"/>
+                <a:cs typeface="+mn-cs"/>
+              </a:defRPr>
+            </a:lvl5pPr>
+            <a:lvl6pPr marL="2286000" indent="0">
+              <a:defRPr sz="1100">
+                <a:solidFill>
+                  <a:schemeClr val="lt1"/>
+                </a:solidFill>
+                <a:latin typeface="+mn-lt"/>
+                <a:ea typeface="+mn-ea"/>
+                <a:cs typeface="+mn-cs"/>
+              </a:defRPr>
+            </a:lvl6pPr>
+            <a:lvl7pPr marL="2743200" indent="0">
+              <a:defRPr sz="1100">
+                <a:solidFill>
+                  <a:schemeClr val="lt1"/>
+                </a:solidFill>
+                <a:latin typeface="+mn-lt"/>
+                <a:ea typeface="+mn-ea"/>
+                <a:cs typeface="+mn-cs"/>
+              </a:defRPr>
+            </a:lvl7pPr>
+            <a:lvl8pPr marL="3200400" indent="0">
+              <a:defRPr sz="1100">
+                <a:solidFill>
+                  <a:schemeClr val="lt1"/>
+                </a:solidFill>
+                <a:latin typeface="+mn-lt"/>
+                <a:ea typeface="+mn-ea"/>
+                <a:cs typeface="+mn-cs"/>
+              </a:defRPr>
+            </a:lvl8pPr>
+            <a:lvl9pPr marL="3657600" indent="0">
+              <a:defRPr sz="1100">
+                <a:solidFill>
+                  <a:schemeClr val="lt1"/>
+                </a:solidFill>
+                <a:latin typeface="+mn-lt"/>
+                <a:ea typeface="+mn-ea"/>
+                <a:cs typeface="+mn-cs"/>
+              </a:defRPr>
+            </a:lvl9pPr>
+          </a:lstStyle>
+          <a:p>
+            <a:pPr algn="ctr"/>
+            <a:r>
+              <a:rPr lang="en-GB"/>
+              <a:t>stdICallable</a:t>
+            </a:r>
+          </a:p>
+        </p:txBody>
+      </p:sp>
+      <p:sp>
+        <p:nvSpPr>
+          <p:cNvPr id="12" name="Rectangle 11">
+            <a:extLst>
+              <a:ext uri="{FF2B5EF4-FFF2-40B4-BE49-F238E27FC236}">
+                <a16:creationId xmlns:a16="http://schemas.microsoft.com/office/drawing/2014/main" id="{DA00EF6B-4501-4EC3-5EF8-0E63714A2418}"/>
+              </a:ext>
+            </a:extLst>
+          </p:cNvPr>
+          <p:cNvSpPr/>
+          <p:nvPr/>
+        </p:nvSpPr>
+        <p:spPr>
+          <a:xfrm>
+            <a:off x="1608665" y="4620360"/>
+            <a:ext cx="1748071" cy="464234"/>
+          </a:xfrm>
+          <a:prstGeom prst="rect">
+            <a:avLst/>
+          </a:prstGeom>
+          <a:solidFill>
+            <a:schemeClr val="tx1">
+              <a:lumMod val="50000"/>
+              <a:lumOff val="50000"/>
+            </a:schemeClr>
+          </a:solidFill>
+        </p:spPr>
+        <p:style>
+          <a:lnRef idx="2">
+            <a:schemeClr val="accent1">
+              <a:shade val="15000"/>
+            </a:schemeClr>
+          </a:lnRef>
+          <a:fillRef idx="1">
+            <a:schemeClr val="accent1"/>
+          </a:fillRef>
+          <a:effectRef idx="0">
+            <a:schemeClr val="accent1"/>
+          </a:effectRef>
+          <a:fontRef idx="minor">
+            <a:schemeClr val="lt1"/>
+          </a:fontRef>
+        </p:style>
+        <p:txBody>
+          <a:bodyPr wrap="square" rtlCol="0" anchor="ctr"/>
+          <a:lstStyle>
+            <a:lvl1pPr marL="0" indent="0">
+              <a:defRPr sz="1100">
+                <a:solidFill>
+                  <a:schemeClr val="lt1"/>
+                </a:solidFill>
+                <a:latin typeface="+mn-lt"/>
+                <a:ea typeface="+mn-ea"/>
+                <a:cs typeface="+mn-cs"/>
+              </a:defRPr>
+            </a:lvl1pPr>
+            <a:lvl2pPr marL="457200" indent="0">
+              <a:defRPr sz="1100">
+                <a:solidFill>
+                  <a:schemeClr val="lt1"/>
+                </a:solidFill>
+                <a:latin typeface="+mn-lt"/>
+                <a:ea typeface="+mn-ea"/>
+                <a:cs typeface="+mn-cs"/>
+              </a:defRPr>
+            </a:lvl2pPr>
+            <a:lvl3pPr marL="914400" indent="0">
+              <a:defRPr sz="1100">
+                <a:solidFill>
+                  <a:schemeClr val="lt1"/>
+                </a:solidFill>
+                <a:latin typeface="+mn-lt"/>
+                <a:ea typeface="+mn-ea"/>
+                <a:cs typeface="+mn-cs"/>
+              </a:defRPr>
+            </a:lvl3pPr>
+            <a:lvl4pPr marL="1371600" indent="0">
+              <a:defRPr sz="1100">
+                <a:solidFill>
+                  <a:schemeClr val="lt1"/>
+                </a:solidFill>
+                <a:latin typeface="+mn-lt"/>
+                <a:ea typeface="+mn-ea"/>
+                <a:cs typeface="+mn-cs"/>
+              </a:defRPr>
+            </a:lvl4pPr>
+            <a:lvl5pPr marL="1828800" indent="0">
+              <a:defRPr sz="1100">
+                <a:solidFill>
+                  <a:schemeClr val="lt1"/>
+                </a:solidFill>
+                <a:latin typeface="+mn-lt"/>
+                <a:ea typeface="+mn-ea"/>
+                <a:cs typeface="+mn-cs"/>
+              </a:defRPr>
+            </a:lvl5pPr>
+            <a:lvl6pPr marL="2286000" indent="0">
+              <a:defRPr sz="1100">
+                <a:solidFill>
+                  <a:schemeClr val="lt1"/>
+                </a:solidFill>
+                <a:latin typeface="+mn-lt"/>
+                <a:ea typeface="+mn-ea"/>
+                <a:cs typeface="+mn-cs"/>
+              </a:defRPr>
+            </a:lvl6pPr>
+            <a:lvl7pPr marL="2743200" indent="0">
+              <a:defRPr sz="1100">
+                <a:solidFill>
+                  <a:schemeClr val="lt1"/>
+                </a:solidFill>
+                <a:latin typeface="+mn-lt"/>
+                <a:ea typeface="+mn-ea"/>
+                <a:cs typeface="+mn-cs"/>
+              </a:defRPr>
+            </a:lvl7pPr>
+            <a:lvl8pPr marL="3200400" indent="0">
+              <a:defRPr sz="1100">
+                <a:solidFill>
+                  <a:schemeClr val="lt1"/>
+                </a:solidFill>
+                <a:latin typeface="+mn-lt"/>
+                <a:ea typeface="+mn-ea"/>
+                <a:cs typeface="+mn-cs"/>
+              </a:defRPr>
+            </a:lvl8pPr>
+            <a:lvl9pPr marL="3657600" indent="0">
+              <a:defRPr sz="1100">
+                <a:solidFill>
+                  <a:schemeClr val="lt1"/>
+                </a:solidFill>
+                <a:latin typeface="+mn-lt"/>
+                <a:ea typeface="+mn-ea"/>
+                <a:cs typeface="+mn-cs"/>
+              </a:defRPr>
+            </a:lvl9pPr>
+          </a:lstStyle>
+          <a:p>
+            <a:pPr algn="ctr"/>
+            <a:r>
+              <a:rPr lang="en-GB"/>
+              <a:t>stdLambda</a:t>
+            </a:r>
+          </a:p>
+        </p:txBody>
+      </p:sp>
+      <p:sp>
+        <p:nvSpPr>
+          <p:cNvPr id="13" name="Rectangle 12">
+            <a:extLst>
+              <a:ext uri="{FF2B5EF4-FFF2-40B4-BE49-F238E27FC236}">
+                <a16:creationId xmlns:a16="http://schemas.microsoft.com/office/drawing/2014/main" id="{B45DA5B5-F2FF-5235-BD65-CA13348BD860}"/>
+              </a:ext>
+            </a:extLst>
+          </p:cNvPr>
+          <p:cNvSpPr/>
+          <p:nvPr/>
+        </p:nvSpPr>
+        <p:spPr>
+          <a:xfrm>
+            <a:off x="1608665" y="5197136"/>
+            <a:ext cx="1748071" cy="464234"/>
+          </a:xfrm>
+          <a:prstGeom prst="rect">
+            <a:avLst/>
+          </a:prstGeom>
+          <a:solidFill>
+            <a:schemeClr val="tx1">
+              <a:lumMod val="50000"/>
+              <a:lumOff val="50000"/>
+            </a:schemeClr>
+          </a:solidFill>
+        </p:spPr>
+        <p:style>
+          <a:lnRef idx="2">
+            <a:schemeClr val="accent1">
+              <a:shade val="15000"/>
+            </a:schemeClr>
+          </a:lnRef>
+          <a:fillRef idx="1">
+            <a:schemeClr val="accent1"/>
+          </a:fillRef>
+          <a:effectRef idx="0">
+            <a:schemeClr val="accent1"/>
+          </a:effectRef>
+          <a:fontRef idx="minor">
+            <a:schemeClr val="lt1"/>
+          </a:fontRef>
+        </p:style>
+        <p:txBody>
+          <a:bodyPr wrap="square" rtlCol="0" anchor="ctr"/>
+          <a:lstStyle>
+            <a:lvl1pPr marL="0" indent="0">
+              <a:defRPr sz="1100">
+                <a:solidFill>
+                  <a:schemeClr val="lt1"/>
+                </a:solidFill>
+                <a:latin typeface="+mn-lt"/>
+                <a:ea typeface="+mn-ea"/>
+                <a:cs typeface="+mn-cs"/>
+              </a:defRPr>
+            </a:lvl1pPr>
+            <a:lvl2pPr marL="457200" indent="0">
+              <a:defRPr sz="1100">
+                <a:solidFill>
+                  <a:schemeClr val="lt1"/>
+                </a:solidFill>
+                <a:latin typeface="+mn-lt"/>
+                <a:ea typeface="+mn-ea"/>
+                <a:cs typeface="+mn-cs"/>
+              </a:defRPr>
+            </a:lvl2pPr>
+            <a:lvl3pPr marL="914400" indent="0">
+              <a:defRPr sz="1100">
+                <a:solidFill>
+                  <a:schemeClr val="lt1"/>
+                </a:solidFill>
+                <a:latin typeface="+mn-lt"/>
+                <a:ea typeface="+mn-ea"/>
+                <a:cs typeface="+mn-cs"/>
+              </a:defRPr>
+            </a:lvl3pPr>
+            <a:lvl4pPr marL="1371600" indent="0">
+              <a:defRPr sz="1100">
+                <a:solidFill>
+                  <a:schemeClr val="lt1"/>
+                </a:solidFill>
+                <a:latin typeface="+mn-lt"/>
+                <a:ea typeface="+mn-ea"/>
+                <a:cs typeface="+mn-cs"/>
+              </a:defRPr>
+            </a:lvl4pPr>
+            <a:lvl5pPr marL="1828800" indent="0">
+              <a:defRPr sz="1100">
+                <a:solidFill>
+                  <a:schemeClr val="lt1"/>
+                </a:solidFill>
+                <a:latin typeface="+mn-lt"/>
+                <a:ea typeface="+mn-ea"/>
+                <a:cs typeface="+mn-cs"/>
+              </a:defRPr>
+            </a:lvl5pPr>
+            <a:lvl6pPr marL="2286000" indent="0">
+              <a:defRPr sz="1100">
+                <a:solidFill>
+                  <a:schemeClr val="lt1"/>
+                </a:solidFill>
+                <a:latin typeface="+mn-lt"/>
+                <a:ea typeface="+mn-ea"/>
+                <a:cs typeface="+mn-cs"/>
+              </a:defRPr>
+            </a:lvl6pPr>
+            <a:lvl7pPr marL="2743200" indent="0">
+              <a:defRPr sz="1100">
+                <a:solidFill>
+                  <a:schemeClr val="lt1"/>
+                </a:solidFill>
+                <a:latin typeface="+mn-lt"/>
+                <a:ea typeface="+mn-ea"/>
+                <a:cs typeface="+mn-cs"/>
+              </a:defRPr>
+            </a:lvl7pPr>
+            <a:lvl8pPr marL="3200400" indent="0">
+              <a:defRPr sz="1100">
+                <a:solidFill>
+                  <a:schemeClr val="lt1"/>
+                </a:solidFill>
+                <a:latin typeface="+mn-lt"/>
+                <a:ea typeface="+mn-ea"/>
+                <a:cs typeface="+mn-cs"/>
+              </a:defRPr>
+            </a:lvl8pPr>
+            <a:lvl9pPr marL="3657600" indent="0">
+              <a:defRPr sz="1100">
+                <a:solidFill>
+                  <a:schemeClr val="lt1"/>
+                </a:solidFill>
+                <a:latin typeface="+mn-lt"/>
+                <a:ea typeface="+mn-ea"/>
+                <a:cs typeface="+mn-cs"/>
+              </a:defRPr>
+            </a:lvl9pPr>
+          </a:lstStyle>
+          <a:p>
+            <a:pPr algn="ctr"/>
+            <a:r>
+              <a:rPr lang="en-GB"/>
+              <a:t>stdRegex</a:t>
+            </a:r>
+          </a:p>
+        </p:txBody>
+      </p:sp>
+      <p:sp>
+        <p:nvSpPr>
+          <p:cNvPr id="14" name="Rectangle 13">
+            <a:extLst>
+              <a:ext uri="{FF2B5EF4-FFF2-40B4-BE49-F238E27FC236}">
+                <a16:creationId xmlns:a16="http://schemas.microsoft.com/office/drawing/2014/main" id="{A9B7EEAF-5602-B23C-C368-36F15F0385AA}"/>
+              </a:ext>
+            </a:extLst>
+          </p:cNvPr>
+          <p:cNvSpPr/>
+          <p:nvPr/>
+        </p:nvSpPr>
+        <p:spPr>
+          <a:xfrm>
+            <a:off x="6142352" y="3862170"/>
+            <a:ext cx="1748071" cy="464234"/>
+          </a:xfrm>
+          <a:prstGeom prst="rect">
+            <a:avLst/>
+          </a:prstGeom>
+          <a:solidFill>
+            <a:srgbClr val="7030A0"/>
+          </a:solidFill>
+          <a:ln>
+            <a:solidFill>
+              <a:srgbClr val="002060"/>
+            </a:solidFill>
+          </a:ln>
+        </p:spPr>
+        <p:style>
+          <a:lnRef idx="2">
+            <a:schemeClr val="accent1">
+              <a:shade val="15000"/>
+            </a:schemeClr>
+          </a:lnRef>
+          <a:fillRef idx="1">
+            <a:schemeClr val="accent1"/>
+          </a:fillRef>
+          <a:effectRef idx="0">
+            <a:schemeClr val="accent1"/>
+          </a:effectRef>
+          <a:fontRef idx="minor">
+            <a:schemeClr val="lt1"/>
+          </a:fontRef>
+        </p:style>
+        <p:txBody>
+          <a:bodyPr wrap="square" rtlCol="0" anchor="ctr"/>
+          <a:lstStyle>
+            <a:lvl1pPr marL="0" indent="0">
+              <a:defRPr sz="1100">
+                <a:solidFill>
+                  <a:schemeClr val="lt1"/>
+                </a:solidFill>
+                <a:latin typeface="+mn-lt"/>
+                <a:ea typeface="+mn-ea"/>
+                <a:cs typeface="+mn-cs"/>
+              </a:defRPr>
+            </a:lvl1pPr>
+            <a:lvl2pPr marL="457200" indent="0">
+              <a:defRPr sz="1100">
+                <a:solidFill>
+                  <a:schemeClr val="lt1"/>
+                </a:solidFill>
+                <a:latin typeface="+mn-lt"/>
+                <a:ea typeface="+mn-ea"/>
+                <a:cs typeface="+mn-cs"/>
+              </a:defRPr>
+            </a:lvl2pPr>
+            <a:lvl3pPr marL="914400" indent="0">
+              <a:defRPr sz="1100">
+                <a:solidFill>
+                  <a:schemeClr val="lt1"/>
+                </a:solidFill>
+                <a:latin typeface="+mn-lt"/>
+                <a:ea typeface="+mn-ea"/>
+                <a:cs typeface="+mn-cs"/>
+              </a:defRPr>
+            </a:lvl3pPr>
+            <a:lvl4pPr marL="1371600" indent="0">
+              <a:defRPr sz="1100">
+                <a:solidFill>
+                  <a:schemeClr val="lt1"/>
+                </a:solidFill>
+                <a:latin typeface="+mn-lt"/>
+                <a:ea typeface="+mn-ea"/>
+                <a:cs typeface="+mn-cs"/>
+              </a:defRPr>
+            </a:lvl4pPr>
+            <a:lvl5pPr marL="1828800" indent="0">
+              <a:defRPr sz="1100">
+                <a:solidFill>
+                  <a:schemeClr val="lt1"/>
+                </a:solidFill>
+                <a:latin typeface="+mn-lt"/>
+                <a:ea typeface="+mn-ea"/>
+                <a:cs typeface="+mn-cs"/>
+              </a:defRPr>
+            </a:lvl5pPr>
+            <a:lvl6pPr marL="2286000" indent="0">
+              <a:defRPr sz="1100">
+                <a:solidFill>
+                  <a:schemeClr val="lt1"/>
+                </a:solidFill>
+                <a:latin typeface="+mn-lt"/>
+                <a:ea typeface="+mn-ea"/>
+                <a:cs typeface="+mn-cs"/>
+              </a:defRPr>
+            </a:lvl6pPr>
+            <a:lvl7pPr marL="2743200" indent="0">
+              <a:defRPr sz="1100">
+                <a:solidFill>
+                  <a:schemeClr val="lt1"/>
+                </a:solidFill>
+                <a:latin typeface="+mn-lt"/>
+                <a:ea typeface="+mn-ea"/>
+                <a:cs typeface="+mn-cs"/>
+              </a:defRPr>
+            </a:lvl7pPr>
+            <a:lvl8pPr marL="3200400" indent="0">
+              <a:defRPr sz="1100">
+                <a:solidFill>
+                  <a:schemeClr val="lt1"/>
+                </a:solidFill>
+                <a:latin typeface="+mn-lt"/>
+                <a:ea typeface="+mn-ea"/>
+                <a:cs typeface="+mn-cs"/>
+              </a:defRPr>
+            </a:lvl8pPr>
+            <a:lvl9pPr marL="3657600" indent="0">
+              <a:defRPr sz="1100">
+                <a:solidFill>
+                  <a:schemeClr val="lt1"/>
+                </a:solidFill>
+                <a:latin typeface="+mn-lt"/>
+                <a:ea typeface="+mn-ea"/>
+                <a:cs typeface="+mn-cs"/>
+              </a:defRPr>
+            </a:lvl9pPr>
+          </a:lstStyle>
+          <a:p>
+            <a:pPr algn="ctr"/>
+            <a:r>
+              <a:rPr lang="en-GB"/>
+              <a:t>xrCategories</a:t>
+            </a:r>
+          </a:p>
+        </p:txBody>
+      </p:sp>
+      <p:sp>
+        <p:nvSpPr>
+          <p:cNvPr id="15" name="Rectangle 14">
+            <a:extLst>
+              <a:ext uri="{FF2B5EF4-FFF2-40B4-BE49-F238E27FC236}">
+                <a16:creationId xmlns:a16="http://schemas.microsoft.com/office/drawing/2014/main" id="{8439F2B9-103C-2942-8E6D-C783419B5B01}"/>
+              </a:ext>
+            </a:extLst>
+          </p:cNvPr>
+          <p:cNvSpPr/>
+          <p:nvPr/>
+        </p:nvSpPr>
+        <p:spPr>
+          <a:xfrm>
+            <a:off x="6142352" y="4438946"/>
+            <a:ext cx="1748071" cy="464234"/>
+          </a:xfrm>
+          <a:prstGeom prst="rect">
+            <a:avLst/>
+          </a:prstGeom>
+          <a:solidFill>
+            <a:srgbClr val="7030A0"/>
+          </a:solidFill>
+          <a:ln>
+            <a:solidFill>
+              <a:srgbClr val="002060"/>
+            </a:solidFill>
+          </a:ln>
+        </p:spPr>
+        <p:style>
+          <a:lnRef idx="2">
+            <a:schemeClr val="accent1">
+              <a:shade val="15000"/>
+            </a:schemeClr>
+          </a:lnRef>
+          <a:fillRef idx="1">
+            <a:schemeClr val="accent1"/>
+          </a:fillRef>
+          <a:effectRef idx="0">
+            <a:schemeClr val="accent1"/>
+          </a:effectRef>
+          <a:fontRef idx="minor">
+            <a:schemeClr val="lt1"/>
+          </a:fontRef>
+        </p:style>
+        <p:txBody>
+          <a:bodyPr wrap="square" rtlCol="0" anchor="ctr"/>
+          <a:lstStyle>
+            <a:lvl1pPr marL="0" indent="0">
+              <a:defRPr sz="1100">
+                <a:solidFill>
+                  <a:schemeClr val="lt1"/>
+                </a:solidFill>
+                <a:latin typeface="+mn-lt"/>
+                <a:ea typeface="+mn-ea"/>
+                <a:cs typeface="+mn-cs"/>
+              </a:defRPr>
+            </a:lvl1pPr>
+            <a:lvl2pPr marL="457200" indent="0">
+              <a:defRPr sz="1100">
+                <a:solidFill>
+                  <a:schemeClr val="lt1"/>
+                </a:solidFill>
+                <a:latin typeface="+mn-lt"/>
+                <a:ea typeface="+mn-ea"/>
+                <a:cs typeface="+mn-cs"/>
+              </a:defRPr>
+            </a:lvl2pPr>
+            <a:lvl3pPr marL="914400" indent="0">
+              <a:defRPr sz="1100">
+                <a:solidFill>
+                  <a:schemeClr val="lt1"/>
+                </a:solidFill>
+                <a:latin typeface="+mn-lt"/>
+                <a:ea typeface="+mn-ea"/>
+                <a:cs typeface="+mn-cs"/>
+              </a:defRPr>
+            </a:lvl3pPr>
+            <a:lvl4pPr marL="1371600" indent="0">
+              <a:defRPr sz="1100">
+                <a:solidFill>
+                  <a:schemeClr val="lt1"/>
+                </a:solidFill>
+                <a:latin typeface="+mn-lt"/>
+                <a:ea typeface="+mn-ea"/>
+                <a:cs typeface="+mn-cs"/>
+              </a:defRPr>
+            </a:lvl4pPr>
+            <a:lvl5pPr marL="1828800" indent="0">
+              <a:defRPr sz="1100">
+                <a:solidFill>
+                  <a:schemeClr val="lt1"/>
+                </a:solidFill>
+                <a:latin typeface="+mn-lt"/>
+                <a:ea typeface="+mn-ea"/>
+                <a:cs typeface="+mn-cs"/>
+              </a:defRPr>
+            </a:lvl5pPr>
+            <a:lvl6pPr marL="2286000" indent="0">
+              <a:defRPr sz="1100">
+                <a:solidFill>
+                  <a:schemeClr val="lt1"/>
+                </a:solidFill>
+                <a:latin typeface="+mn-lt"/>
+                <a:ea typeface="+mn-ea"/>
+                <a:cs typeface="+mn-cs"/>
+              </a:defRPr>
+            </a:lvl6pPr>
+            <a:lvl7pPr marL="2743200" indent="0">
+              <a:defRPr sz="1100">
+                <a:solidFill>
+                  <a:schemeClr val="lt1"/>
+                </a:solidFill>
+                <a:latin typeface="+mn-lt"/>
+                <a:ea typeface="+mn-ea"/>
+                <a:cs typeface="+mn-cs"/>
+              </a:defRPr>
+            </a:lvl7pPr>
+            <a:lvl8pPr marL="3200400" indent="0">
+              <a:defRPr sz="1100">
+                <a:solidFill>
+                  <a:schemeClr val="lt1"/>
+                </a:solidFill>
+                <a:latin typeface="+mn-lt"/>
+                <a:ea typeface="+mn-ea"/>
+                <a:cs typeface="+mn-cs"/>
+              </a:defRPr>
+            </a:lvl8pPr>
+            <a:lvl9pPr marL="3657600" indent="0">
+              <a:defRPr sz="1100">
+                <a:solidFill>
+                  <a:schemeClr val="lt1"/>
+                </a:solidFill>
+                <a:latin typeface="+mn-lt"/>
+                <a:ea typeface="+mn-ea"/>
+                <a:cs typeface="+mn-cs"/>
+              </a:defRPr>
+            </a:lvl9pPr>
+          </a:lstStyle>
+          <a:p>
+            <a:pPr algn="ctr"/>
+            <a:r>
+              <a:rPr lang="en-GB"/>
+              <a:t>xrRules</a:t>
+            </a:r>
+          </a:p>
+        </p:txBody>
+      </p:sp>
+      <p:sp>
+        <p:nvSpPr>
+          <p:cNvPr id="16" name="Rectangle 15">
+            <a:extLst>
+              <a:ext uri="{FF2B5EF4-FFF2-40B4-BE49-F238E27FC236}">
+                <a16:creationId xmlns:a16="http://schemas.microsoft.com/office/drawing/2014/main" id="{8EA53CEB-CF43-1032-32FA-5371BF7C99B8}"/>
+              </a:ext>
+            </a:extLst>
+          </p:cNvPr>
+          <p:cNvSpPr/>
+          <p:nvPr/>
+        </p:nvSpPr>
+        <p:spPr>
+          <a:xfrm>
+            <a:off x="3887843" y="4291234"/>
+            <a:ext cx="1748072" cy="464234"/>
+          </a:xfrm>
+          <a:prstGeom prst="rect">
+            <a:avLst/>
+          </a:prstGeom>
+          <a:solidFill>
+            <a:srgbClr val="7030A0"/>
+          </a:solidFill>
+          <a:ln>
+            <a:solidFill>
+              <a:srgbClr val="002060"/>
+            </a:solidFill>
+          </a:ln>
+        </p:spPr>
+        <p:style>
+          <a:lnRef idx="2">
+            <a:schemeClr val="accent1">
+              <a:shade val="15000"/>
+            </a:schemeClr>
+          </a:lnRef>
+          <a:fillRef idx="1">
+            <a:schemeClr val="accent1"/>
+          </a:fillRef>
+          <a:effectRef idx="0">
+            <a:schemeClr val="accent1"/>
+          </a:effectRef>
+          <a:fontRef idx="minor">
+            <a:schemeClr val="lt1"/>
+          </a:fontRef>
+        </p:style>
+        <p:txBody>
+          <a:bodyPr wrap="square" rtlCol="0" anchor="ctr"/>
+          <a:lstStyle>
+            <a:lvl1pPr marL="0" indent="0">
+              <a:defRPr sz="1100">
+                <a:solidFill>
+                  <a:schemeClr val="lt1"/>
+                </a:solidFill>
+                <a:latin typeface="+mn-lt"/>
+                <a:ea typeface="+mn-ea"/>
+                <a:cs typeface="+mn-cs"/>
+              </a:defRPr>
+            </a:lvl1pPr>
+            <a:lvl2pPr marL="457200" indent="0">
+              <a:defRPr sz="1100">
+                <a:solidFill>
+                  <a:schemeClr val="lt1"/>
+                </a:solidFill>
+                <a:latin typeface="+mn-lt"/>
+                <a:ea typeface="+mn-ea"/>
+                <a:cs typeface="+mn-cs"/>
+              </a:defRPr>
+            </a:lvl2pPr>
+            <a:lvl3pPr marL="914400" indent="0">
+              <a:defRPr sz="1100">
+                <a:solidFill>
+                  <a:schemeClr val="lt1"/>
+                </a:solidFill>
+                <a:latin typeface="+mn-lt"/>
+                <a:ea typeface="+mn-ea"/>
+                <a:cs typeface="+mn-cs"/>
+              </a:defRPr>
+            </a:lvl3pPr>
+            <a:lvl4pPr marL="1371600" indent="0">
+              <a:defRPr sz="1100">
+                <a:solidFill>
+                  <a:schemeClr val="lt1"/>
+                </a:solidFill>
+                <a:latin typeface="+mn-lt"/>
+                <a:ea typeface="+mn-ea"/>
+                <a:cs typeface="+mn-cs"/>
+              </a:defRPr>
+            </a:lvl4pPr>
+            <a:lvl5pPr marL="1828800" indent="0">
+              <a:defRPr sz="1100">
+                <a:solidFill>
+                  <a:schemeClr val="lt1"/>
+                </a:solidFill>
+                <a:latin typeface="+mn-lt"/>
+                <a:ea typeface="+mn-ea"/>
+                <a:cs typeface="+mn-cs"/>
+              </a:defRPr>
+            </a:lvl5pPr>
+            <a:lvl6pPr marL="2286000" indent="0">
+              <a:defRPr sz="1100">
+                <a:solidFill>
+                  <a:schemeClr val="lt1"/>
+                </a:solidFill>
+                <a:latin typeface="+mn-lt"/>
+                <a:ea typeface="+mn-ea"/>
+                <a:cs typeface="+mn-cs"/>
+              </a:defRPr>
+            </a:lvl6pPr>
+            <a:lvl7pPr marL="2743200" indent="0">
+              <a:defRPr sz="1100">
+                <a:solidFill>
+                  <a:schemeClr val="lt1"/>
+                </a:solidFill>
+                <a:latin typeface="+mn-lt"/>
+                <a:ea typeface="+mn-ea"/>
+                <a:cs typeface="+mn-cs"/>
+              </a:defRPr>
+            </a:lvl7pPr>
+            <a:lvl8pPr marL="3200400" indent="0">
+              <a:defRPr sz="1100">
+                <a:solidFill>
+                  <a:schemeClr val="lt1"/>
+                </a:solidFill>
+                <a:latin typeface="+mn-lt"/>
+                <a:ea typeface="+mn-ea"/>
+                <a:cs typeface="+mn-cs"/>
+              </a:defRPr>
+            </a:lvl8pPr>
+            <a:lvl9pPr marL="3657600" indent="0">
+              <a:defRPr sz="1100">
+                <a:solidFill>
+                  <a:schemeClr val="lt1"/>
+                </a:solidFill>
+                <a:latin typeface="+mn-lt"/>
+                <a:ea typeface="+mn-ea"/>
+                <a:cs typeface="+mn-cs"/>
+              </a:defRPr>
+            </a:lvl9pPr>
+          </a:lstStyle>
+          <a:p>
+            <a:pPr algn="ctr"/>
+            <a:r>
+              <a:rPr lang="en-GB"/>
+              <a:t>xrLambdaEx</a:t>
+            </a:r>
+          </a:p>
+        </p:txBody>
+      </p:sp>
+      <p:sp>
+        <p:nvSpPr>
+          <p:cNvPr id="17" name="Rectangle 16">
+            <a:extLst>
+              <a:ext uri="{FF2B5EF4-FFF2-40B4-BE49-F238E27FC236}">
+                <a16:creationId xmlns:a16="http://schemas.microsoft.com/office/drawing/2014/main" id="{4ECD1577-5EF8-AA47-392E-028A12AA397A}"/>
+              </a:ext>
+            </a:extLst>
+          </p:cNvPr>
+          <p:cNvSpPr/>
+          <p:nvPr/>
+        </p:nvSpPr>
+        <p:spPr>
+          <a:xfrm>
+            <a:off x="8538762" y="3211831"/>
+            <a:ext cx="1748071" cy="464234"/>
+          </a:xfrm>
+          <a:prstGeom prst="rect">
+            <a:avLst/>
+          </a:prstGeom>
+          <a:solidFill>
+            <a:srgbClr val="7030A0"/>
+          </a:solidFill>
+          <a:ln>
+            <a:solidFill>
+              <a:srgbClr val="002060"/>
+            </a:solidFill>
+          </a:ln>
+        </p:spPr>
+        <p:style>
+          <a:lnRef idx="2">
+            <a:schemeClr val="accent1">
+              <a:shade val="15000"/>
+            </a:schemeClr>
+          </a:lnRef>
+          <a:fillRef idx="1">
+            <a:schemeClr val="accent1"/>
+          </a:fillRef>
+          <a:effectRef idx="0">
+            <a:schemeClr val="accent1"/>
+          </a:effectRef>
+          <a:fontRef idx="minor">
+            <a:schemeClr val="lt1"/>
+          </a:fontRef>
+        </p:style>
+        <p:txBody>
+          <a:bodyPr wrap="square" rtlCol="0" anchor="ctr"/>
+          <a:lstStyle>
+            <a:lvl1pPr marL="0" indent="0">
+              <a:defRPr sz="1100">
+                <a:solidFill>
+                  <a:schemeClr val="lt1"/>
+                </a:solidFill>
+                <a:latin typeface="+mn-lt"/>
+                <a:ea typeface="+mn-ea"/>
+                <a:cs typeface="+mn-cs"/>
+              </a:defRPr>
+            </a:lvl1pPr>
+            <a:lvl2pPr marL="457200" indent="0">
+              <a:defRPr sz="1100">
+                <a:solidFill>
+                  <a:schemeClr val="lt1"/>
+                </a:solidFill>
+                <a:latin typeface="+mn-lt"/>
+                <a:ea typeface="+mn-ea"/>
+                <a:cs typeface="+mn-cs"/>
+              </a:defRPr>
+            </a:lvl2pPr>
+            <a:lvl3pPr marL="914400" indent="0">
+              <a:defRPr sz="1100">
+                <a:solidFill>
+                  <a:schemeClr val="lt1"/>
+                </a:solidFill>
+                <a:latin typeface="+mn-lt"/>
+                <a:ea typeface="+mn-ea"/>
+                <a:cs typeface="+mn-cs"/>
+              </a:defRPr>
+            </a:lvl3pPr>
+            <a:lvl4pPr marL="1371600" indent="0">
+              <a:defRPr sz="1100">
+                <a:solidFill>
+                  <a:schemeClr val="lt1"/>
+                </a:solidFill>
+                <a:latin typeface="+mn-lt"/>
+                <a:ea typeface="+mn-ea"/>
+                <a:cs typeface="+mn-cs"/>
+              </a:defRPr>
+            </a:lvl4pPr>
+            <a:lvl5pPr marL="1828800" indent="0">
+              <a:defRPr sz="1100">
+                <a:solidFill>
+                  <a:schemeClr val="lt1"/>
+                </a:solidFill>
+                <a:latin typeface="+mn-lt"/>
+                <a:ea typeface="+mn-ea"/>
+                <a:cs typeface="+mn-cs"/>
+              </a:defRPr>
+            </a:lvl5pPr>
+            <a:lvl6pPr marL="2286000" indent="0">
+              <a:defRPr sz="1100">
+                <a:solidFill>
+                  <a:schemeClr val="lt1"/>
+                </a:solidFill>
+                <a:latin typeface="+mn-lt"/>
+                <a:ea typeface="+mn-ea"/>
+                <a:cs typeface="+mn-cs"/>
+              </a:defRPr>
+            </a:lvl6pPr>
+            <a:lvl7pPr marL="2743200" indent="0">
+              <a:defRPr sz="1100">
+                <a:solidFill>
+                  <a:schemeClr val="lt1"/>
+                </a:solidFill>
+                <a:latin typeface="+mn-lt"/>
+                <a:ea typeface="+mn-ea"/>
+                <a:cs typeface="+mn-cs"/>
+              </a:defRPr>
+            </a:lvl7pPr>
+            <a:lvl8pPr marL="3200400" indent="0">
+              <a:defRPr sz="1100">
+                <a:solidFill>
+                  <a:schemeClr val="lt1"/>
+                </a:solidFill>
+                <a:latin typeface="+mn-lt"/>
+                <a:ea typeface="+mn-ea"/>
+                <a:cs typeface="+mn-cs"/>
+              </a:defRPr>
+            </a:lvl8pPr>
+            <a:lvl9pPr marL="3657600" indent="0">
+              <a:defRPr sz="1100">
+                <a:solidFill>
+                  <a:schemeClr val="lt1"/>
+                </a:solidFill>
+                <a:latin typeface="+mn-lt"/>
+                <a:ea typeface="+mn-ea"/>
+                <a:cs typeface="+mn-cs"/>
+              </a:defRPr>
+            </a:lvl9pPr>
+          </a:lstStyle>
+          <a:p>
+            <a:pPr algn="ctr"/>
+            <a:r>
+              <a:rPr lang="en-GB"/>
+              <a:t>xrExtractor</a:t>
+            </a:r>
+          </a:p>
+        </p:txBody>
+      </p:sp>
+      <p:cxnSp>
+        <p:nvCxnSpPr>
+          <p:cNvPr id="18" name="Straight Arrow Connector 17">
+            <a:extLst>
+              <a:ext uri="{FF2B5EF4-FFF2-40B4-BE49-F238E27FC236}">
+                <a16:creationId xmlns:a16="http://schemas.microsoft.com/office/drawing/2014/main" id="{1104748A-4285-F169-1B3B-FE7416D4EFE5}"/>
+              </a:ext>
+            </a:extLst>
+          </p:cNvPr>
+          <p:cNvCxnSpPr>
+            <a:stCxn id="16" idx="3"/>
+            <a:endCxn id="15" idx="1"/>
+          </p:cNvCxnSpPr>
+          <p:nvPr/>
+        </p:nvCxnSpPr>
+        <p:spPr>
+          <a:xfrm>
+            <a:off x="5635915" y="4523351"/>
+            <a:ext cx="506437" cy="147712"/>
+          </a:xfrm>
+          <a:prstGeom prst="straightConnector1">
+            <a:avLst/>
+          </a:prstGeom>
+          <a:ln>
+            <a:solidFill>
+              <a:srgbClr val="002060"/>
+            </a:solidFill>
+            <a:tailEnd type="triangle"/>
+          </a:ln>
+        </p:spPr>
+        <p:style>
+          <a:lnRef idx="1">
+            <a:schemeClr val="accent1"/>
+          </a:lnRef>
+          <a:fillRef idx="0">
+            <a:schemeClr val="accent1"/>
+          </a:fillRef>
+          <a:effectRef idx="0">
+            <a:schemeClr val="accent1"/>
+          </a:effectRef>
+          <a:fontRef idx="minor">
+            <a:schemeClr val="tx1"/>
+          </a:fontRef>
+        </p:style>
+      </p:cxnSp>
+      <p:cxnSp>
+        <p:nvCxnSpPr>
+          <p:cNvPr id="19" name="Straight Arrow Connector 18">
+            <a:extLst>
+              <a:ext uri="{FF2B5EF4-FFF2-40B4-BE49-F238E27FC236}">
+                <a16:creationId xmlns:a16="http://schemas.microsoft.com/office/drawing/2014/main" id="{582863D5-5F21-9BBA-A585-EA461E7CE56F}"/>
+              </a:ext>
+            </a:extLst>
+          </p:cNvPr>
+          <p:cNvCxnSpPr>
+            <a:stCxn id="16" idx="3"/>
+            <a:endCxn id="14" idx="1"/>
+          </p:cNvCxnSpPr>
+          <p:nvPr/>
+        </p:nvCxnSpPr>
+        <p:spPr>
+          <a:xfrm flipV="1">
+            <a:off x="5635915" y="4094287"/>
+            <a:ext cx="506437" cy="429064"/>
+          </a:xfrm>
+          <a:prstGeom prst="straightConnector1">
+            <a:avLst/>
+          </a:prstGeom>
+          <a:ln>
+            <a:solidFill>
+              <a:srgbClr val="002060"/>
+            </a:solidFill>
+            <a:tailEnd type="triangle"/>
+          </a:ln>
+        </p:spPr>
+        <p:style>
+          <a:lnRef idx="1">
+            <a:schemeClr val="accent1"/>
+          </a:lnRef>
+          <a:fillRef idx="0">
+            <a:schemeClr val="accent1"/>
+          </a:fillRef>
+          <a:effectRef idx="0">
+            <a:schemeClr val="accent1"/>
+          </a:effectRef>
+          <a:fontRef idx="minor">
+            <a:schemeClr val="tx1"/>
+          </a:fontRef>
+        </p:style>
+      </p:cxnSp>
+      <p:cxnSp>
+        <p:nvCxnSpPr>
+          <p:cNvPr id="20" name="Straight Arrow Connector 19">
+            <a:extLst>
+              <a:ext uri="{FF2B5EF4-FFF2-40B4-BE49-F238E27FC236}">
+                <a16:creationId xmlns:a16="http://schemas.microsoft.com/office/drawing/2014/main" id="{9F6B8AC1-AF83-8FD3-DAD1-D0A81DCA846C}"/>
+              </a:ext>
+            </a:extLst>
+          </p:cNvPr>
+          <p:cNvCxnSpPr>
+            <a:cxnSpLocks/>
+            <a:stCxn id="14" idx="3"/>
+            <a:endCxn id="17" idx="1"/>
+          </p:cNvCxnSpPr>
+          <p:nvPr/>
+        </p:nvCxnSpPr>
+        <p:spPr>
+          <a:xfrm flipV="1">
+            <a:off x="7890423" y="3443948"/>
+            <a:ext cx="648339" cy="650339"/>
+          </a:xfrm>
+          <a:prstGeom prst="straightConnector1">
+            <a:avLst/>
+          </a:prstGeom>
+          <a:ln>
+            <a:solidFill>
+              <a:srgbClr val="002060"/>
+            </a:solidFill>
+            <a:tailEnd type="triangle"/>
+          </a:ln>
+        </p:spPr>
+        <p:style>
+          <a:lnRef idx="1">
+            <a:schemeClr val="accent1"/>
+          </a:lnRef>
+          <a:fillRef idx="0">
+            <a:schemeClr val="accent1"/>
+          </a:fillRef>
+          <a:effectRef idx="0">
+            <a:schemeClr val="accent1"/>
+          </a:effectRef>
+          <a:fontRef idx="minor">
+            <a:schemeClr val="tx1"/>
+          </a:fontRef>
+        </p:style>
+      </p:cxnSp>
+      <p:cxnSp>
+        <p:nvCxnSpPr>
+          <p:cNvPr id="21" name="Straight Arrow Connector 20">
+            <a:extLst>
+              <a:ext uri="{FF2B5EF4-FFF2-40B4-BE49-F238E27FC236}">
+                <a16:creationId xmlns:a16="http://schemas.microsoft.com/office/drawing/2014/main" id="{4714E2C4-AA5B-D870-5D7D-5C4FF354AE85}"/>
+              </a:ext>
+            </a:extLst>
+          </p:cNvPr>
+          <p:cNvCxnSpPr>
+            <a:stCxn id="15" idx="3"/>
+            <a:endCxn id="17" idx="1"/>
+          </p:cNvCxnSpPr>
+          <p:nvPr/>
+        </p:nvCxnSpPr>
+        <p:spPr>
+          <a:xfrm flipV="1">
+            <a:off x="7890423" y="3443948"/>
+            <a:ext cx="648339" cy="1227115"/>
+          </a:xfrm>
+          <a:prstGeom prst="straightConnector1">
+            <a:avLst/>
+          </a:prstGeom>
+          <a:ln>
+            <a:solidFill>
+              <a:srgbClr val="002060"/>
+            </a:solidFill>
+            <a:tailEnd type="triangle"/>
+          </a:ln>
+        </p:spPr>
+        <p:style>
+          <a:lnRef idx="1">
+            <a:schemeClr val="accent1"/>
+          </a:lnRef>
+          <a:fillRef idx="0">
+            <a:schemeClr val="accent1"/>
+          </a:fillRef>
+          <a:effectRef idx="0">
+            <a:schemeClr val="accent1"/>
+          </a:effectRef>
+          <a:fontRef idx="minor">
+            <a:schemeClr val="tx1"/>
+          </a:fontRef>
+        </p:style>
+      </p:cxnSp>
+      <p:cxnSp>
+        <p:nvCxnSpPr>
+          <p:cNvPr id="22" name="Straight Arrow Connector 21">
+            <a:extLst>
+              <a:ext uri="{FF2B5EF4-FFF2-40B4-BE49-F238E27FC236}">
+                <a16:creationId xmlns:a16="http://schemas.microsoft.com/office/drawing/2014/main" id="{57057BC4-C86B-7429-97EF-28C9F187F394}"/>
+              </a:ext>
+            </a:extLst>
+          </p:cNvPr>
+          <p:cNvCxnSpPr>
+            <a:stCxn id="10" idx="3"/>
+            <a:endCxn id="17" idx="1"/>
+          </p:cNvCxnSpPr>
+          <p:nvPr/>
+        </p:nvCxnSpPr>
+        <p:spPr>
+          <a:xfrm>
+            <a:off x="3356736" y="1017269"/>
+            <a:ext cx="5182026" cy="2426679"/>
+          </a:xfrm>
+          <a:prstGeom prst="straightConnector1">
+            <a:avLst/>
+          </a:prstGeom>
+          <a:ln>
+            <a:solidFill>
+              <a:srgbClr val="002060"/>
+            </a:solidFill>
+            <a:tailEnd type="triangle"/>
+          </a:ln>
+        </p:spPr>
+        <p:style>
+          <a:lnRef idx="1">
+            <a:schemeClr val="accent1"/>
+          </a:lnRef>
+          <a:fillRef idx="0">
+            <a:schemeClr val="accent1"/>
+          </a:fillRef>
+          <a:effectRef idx="0">
+            <a:schemeClr val="accent1"/>
+          </a:effectRef>
+          <a:fontRef idx="minor">
+            <a:schemeClr val="tx1"/>
+          </a:fontRef>
+        </p:style>
+      </p:cxnSp>
+      <p:cxnSp>
+        <p:nvCxnSpPr>
+          <p:cNvPr id="23" name="Straight Arrow Connector 22">
+            <a:extLst>
+              <a:ext uri="{FF2B5EF4-FFF2-40B4-BE49-F238E27FC236}">
+                <a16:creationId xmlns:a16="http://schemas.microsoft.com/office/drawing/2014/main" id="{349E264A-158F-B925-01F4-4C08B40AADB3}"/>
+              </a:ext>
+            </a:extLst>
+          </p:cNvPr>
+          <p:cNvCxnSpPr>
+            <a:stCxn id="12" idx="3"/>
+            <a:endCxn id="16" idx="1"/>
+          </p:cNvCxnSpPr>
+          <p:nvPr/>
+        </p:nvCxnSpPr>
+        <p:spPr>
+          <a:xfrm flipV="1">
+            <a:off x="3356736" y="4523351"/>
+            <a:ext cx="531107" cy="329126"/>
+          </a:xfrm>
+          <a:prstGeom prst="straightConnector1">
+            <a:avLst/>
+          </a:prstGeom>
+          <a:ln>
+            <a:solidFill>
+              <a:srgbClr val="002060"/>
+            </a:solidFill>
+            <a:tailEnd type="triangle"/>
+          </a:ln>
+        </p:spPr>
+        <p:style>
+          <a:lnRef idx="1">
+            <a:schemeClr val="accent1"/>
+          </a:lnRef>
+          <a:fillRef idx="0">
+            <a:schemeClr val="accent1"/>
+          </a:fillRef>
+          <a:effectRef idx="0">
+            <a:schemeClr val="accent1"/>
+          </a:effectRef>
+          <a:fontRef idx="minor">
+            <a:schemeClr val="tx1"/>
+          </a:fontRef>
+        </p:style>
+      </p:cxnSp>
+      <p:cxnSp>
+        <p:nvCxnSpPr>
+          <p:cNvPr id="24" name="Straight Arrow Connector 23">
+            <a:extLst>
+              <a:ext uri="{FF2B5EF4-FFF2-40B4-BE49-F238E27FC236}">
+                <a16:creationId xmlns:a16="http://schemas.microsoft.com/office/drawing/2014/main" id="{F54FD3B2-D869-9067-B313-1836FBDDA26E}"/>
+              </a:ext>
+            </a:extLst>
+          </p:cNvPr>
+          <p:cNvCxnSpPr>
+            <a:stCxn id="9" idx="3"/>
+            <a:endCxn id="16" idx="1"/>
+          </p:cNvCxnSpPr>
+          <p:nvPr/>
+        </p:nvCxnSpPr>
+        <p:spPr>
+          <a:xfrm>
+            <a:off x="3356736" y="3695409"/>
+            <a:ext cx="531107" cy="827942"/>
+          </a:xfrm>
+          <a:prstGeom prst="straightConnector1">
+            <a:avLst/>
+          </a:prstGeom>
+          <a:ln>
+            <a:solidFill>
+              <a:srgbClr val="002060"/>
+            </a:solidFill>
+            <a:tailEnd type="triangle"/>
+          </a:ln>
+        </p:spPr>
+        <p:style>
+          <a:lnRef idx="1">
+            <a:schemeClr val="accent1"/>
+          </a:lnRef>
+          <a:fillRef idx="0">
+            <a:schemeClr val="accent1"/>
+          </a:fillRef>
+          <a:effectRef idx="0">
+            <a:schemeClr val="accent1"/>
+          </a:effectRef>
+          <a:fontRef idx="minor">
+            <a:schemeClr val="tx1"/>
+          </a:fontRef>
+        </p:style>
+      </p:cxnSp>
+      <p:cxnSp>
+        <p:nvCxnSpPr>
+          <p:cNvPr id="25" name="Straight Arrow Connector 24">
+            <a:extLst>
+              <a:ext uri="{FF2B5EF4-FFF2-40B4-BE49-F238E27FC236}">
+                <a16:creationId xmlns:a16="http://schemas.microsoft.com/office/drawing/2014/main" id="{0F06B4D6-D48C-583D-6B32-54A9752CF4C9}"/>
+              </a:ext>
+            </a:extLst>
+          </p:cNvPr>
+          <p:cNvCxnSpPr>
+            <a:cxnSpLocks/>
+            <a:stCxn id="11" idx="3"/>
+            <a:endCxn id="16" idx="1"/>
+          </p:cNvCxnSpPr>
+          <p:nvPr/>
+        </p:nvCxnSpPr>
+        <p:spPr>
+          <a:xfrm>
+            <a:off x="3356736" y="4275701"/>
+            <a:ext cx="531107" cy="247650"/>
+          </a:xfrm>
+          <a:prstGeom prst="straightConnector1">
+            <a:avLst/>
+          </a:prstGeom>
+          <a:ln>
+            <a:solidFill>
+              <a:srgbClr val="002060"/>
+            </a:solidFill>
+            <a:tailEnd type="triangle"/>
+          </a:ln>
+        </p:spPr>
+        <p:style>
+          <a:lnRef idx="1">
+            <a:schemeClr val="accent1"/>
+          </a:lnRef>
+          <a:fillRef idx="0">
+            <a:schemeClr val="accent1"/>
+          </a:fillRef>
+          <a:effectRef idx="0">
+            <a:schemeClr val="accent1"/>
+          </a:effectRef>
+          <a:fontRef idx="minor">
+            <a:schemeClr val="tx1"/>
+          </a:fontRef>
+        </p:style>
+      </p:cxnSp>
+      <p:cxnSp>
+        <p:nvCxnSpPr>
+          <p:cNvPr id="26" name="Straight Arrow Connector 25">
+            <a:extLst>
+              <a:ext uri="{FF2B5EF4-FFF2-40B4-BE49-F238E27FC236}">
+                <a16:creationId xmlns:a16="http://schemas.microsoft.com/office/drawing/2014/main" id="{CDFD80DC-4C5A-31BD-ED32-0FCE2830979A}"/>
+              </a:ext>
+            </a:extLst>
+          </p:cNvPr>
+          <p:cNvCxnSpPr>
+            <a:cxnSpLocks/>
+            <a:stCxn id="7" idx="3"/>
+            <a:endCxn id="17" idx="1"/>
+          </p:cNvCxnSpPr>
+          <p:nvPr/>
+        </p:nvCxnSpPr>
+        <p:spPr>
+          <a:xfrm>
+            <a:off x="3356736" y="1551842"/>
+            <a:ext cx="5182026" cy="1892106"/>
+          </a:xfrm>
+          <a:prstGeom prst="straightConnector1">
+            <a:avLst/>
+          </a:prstGeom>
+          <a:ln>
+            <a:solidFill>
+              <a:srgbClr val="002060"/>
+            </a:solidFill>
+            <a:tailEnd type="triangle"/>
+          </a:ln>
+        </p:spPr>
+        <p:style>
+          <a:lnRef idx="1">
+            <a:schemeClr val="accent1"/>
+          </a:lnRef>
+          <a:fillRef idx="0">
+            <a:schemeClr val="accent1"/>
+          </a:fillRef>
+          <a:effectRef idx="0">
+            <a:schemeClr val="accent1"/>
+          </a:effectRef>
+          <a:fontRef idx="minor">
+            <a:schemeClr val="tx1"/>
+          </a:fontRef>
+        </p:style>
+      </p:cxnSp>
+      <p:cxnSp>
+        <p:nvCxnSpPr>
+          <p:cNvPr id="27" name="Straight Arrow Connector 26">
+            <a:extLst>
+              <a:ext uri="{FF2B5EF4-FFF2-40B4-BE49-F238E27FC236}">
+                <a16:creationId xmlns:a16="http://schemas.microsoft.com/office/drawing/2014/main" id="{B534F9D7-CE01-2E40-18E4-C82B10B60930}"/>
+              </a:ext>
+            </a:extLst>
+          </p:cNvPr>
+          <p:cNvCxnSpPr>
+            <a:cxnSpLocks/>
+            <a:stCxn id="8" idx="3"/>
+            <a:endCxn id="16" idx="1"/>
+          </p:cNvCxnSpPr>
+          <p:nvPr/>
+        </p:nvCxnSpPr>
+        <p:spPr>
+          <a:xfrm>
+            <a:off x="3356736" y="3118633"/>
+            <a:ext cx="531107" cy="1404718"/>
+          </a:xfrm>
+          <a:prstGeom prst="straightConnector1">
+            <a:avLst/>
+          </a:prstGeom>
+          <a:ln>
+            <a:solidFill>
+              <a:srgbClr val="002060"/>
+            </a:solidFill>
+            <a:tailEnd type="triangle"/>
+          </a:ln>
+        </p:spPr>
+        <p:style>
+          <a:lnRef idx="1">
+            <a:schemeClr val="accent1"/>
+          </a:lnRef>
+          <a:fillRef idx="0">
+            <a:schemeClr val="accent1"/>
+          </a:fillRef>
+          <a:effectRef idx="0">
+            <a:schemeClr val="accent1"/>
+          </a:effectRef>
+          <a:fontRef idx="minor">
+            <a:schemeClr val="tx1"/>
+          </a:fontRef>
+        </p:style>
+      </p:cxnSp>
+      <p:cxnSp>
+        <p:nvCxnSpPr>
+          <p:cNvPr id="28" name="Straight Arrow Connector 27">
+            <a:extLst>
+              <a:ext uri="{FF2B5EF4-FFF2-40B4-BE49-F238E27FC236}">
+                <a16:creationId xmlns:a16="http://schemas.microsoft.com/office/drawing/2014/main" id="{E508B70A-F40A-6626-05B9-73BBBF956F3C}"/>
+              </a:ext>
+            </a:extLst>
+          </p:cNvPr>
+          <p:cNvCxnSpPr>
+            <a:cxnSpLocks/>
+            <a:stCxn id="13" idx="3"/>
+            <a:endCxn id="16" idx="1"/>
+          </p:cNvCxnSpPr>
+          <p:nvPr/>
+        </p:nvCxnSpPr>
+        <p:spPr>
+          <a:xfrm flipV="1">
+            <a:off x="3356736" y="4523351"/>
+            <a:ext cx="531107" cy="905902"/>
+          </a:xfrm>
+          <a:prstGeom prst="straightConnector1">
+            <a:avLst/>
+          </a:prstGeom>
+          <a:ln>
+            <a:solidFill>
+              <a:srgbClr val="002060"/>
+            </a:solidFill>
+            <a:tailEnd type="triangle"/>
+          </a:ln>
+        </p:spPr>
+        <p:style>
+          <a:lnRef idx="1">
+            <a:schemeClr val="accent1"/>
+          </a:lnRef>
+          <a:fillRef idx="0">
+            <a:schemeClr val="accent1"/>
+          </a:fillRef>
+          <a:effectRef idx="0">
+            <a:schemeClr val="accent1"/>
+          </a:effectRef>
+          <a:fontRef idx="minor">
+            <a:schemeClr val="tx1"/>
+          </a:fontRef>
+        </p:style>
+      </p:cxnSp>
+      <p:sp>
+        <p:nvSpPr>
+          <p:cNvPr id="29" name="Speech Bubble: Rectangle with Corners Rounded 28">
+            <a:extLst>
+              <a:ext uri="{FF2B5EF4-FFF2-40B4-BE49-F238E27FC236}">
+                <a16:creationId xmlns:a16="http://schemas.microsoft.com/office/drawing/2014/main" id="{5EB120D5-F7C3-E960-2B8F-D6223AD3AACE}"/>
+              </a:ext>
+            </a:extLst>
+          </p:cNvPr>
+          <p:cNvSpPr/>
+          <p:nvPr/>
+        </p:nvSpPr>
+        <p:spPr>
+          <a:xfrm>
+            <a:off x="3665483" y="202825"/>
+            <a:ext cx="1317896" cy="469785"/>
+          </a:xfrm>
+          <a:prstGeom prst="wedgeRoundRectCallout">
+            <a:avLst>
+              <a:gd name="adj1" fmla="val -68226"/>
+              <a:gd name="adj2" fmla="val 111673"/>
+              <a:gd name="adj3" fmla="val 16667"/>
+            </a:avLst>
+          </a:prstGeom>
+        </p:spPr>
+        <p:style>
+          <a:lnRef idx="2">
+            <a:schemeClr val="accent3">
+              <a:shade val="15000"/>
+            </a:schemeClr>
+          </a:lnRef>
+          <a:fillRef idx="1">
+            <a:schemeClr val="accent3"/>
+          </a:fillRef>
+          <a:effectRef idx="0">
+            <a:schemeClr val="accent3"/>
+          </a:effectRef>
+          <a:fontRef idx="minor">
+            <a:schemeClr val="lt1"/>
+          </a:fontRef>
+        </p:style>
+        <p:txBody>
+          <a:bodyPr wrap="square" rtlCol="0" anchor="ctr"/>
+          <a:lstStyle>
+            <a:lvl1pPr marL="0" indent="0">
+              <a:defRPr sz="1100">
+                <a:solidFill>
+                  <a:schemeClr val="lt1"/>
+                </a:solidFill>
+                <a:latin typeface="+mn-lt"/>
+                <a:ea typeface="+mn-ea"/>
+                <a:cs typeface="+mn-cs"/>
+              </a:defRPr>
+            </a:lvl1pPr>
+            <a:lvl2pPr marL="457200" indent="0">
+              <a:defRPr sz="1100">
+                <a:solidFill>
+                  <a:schemeClr val="lt1"/>
+                </a:solidFill>
+                <a:latin typeface="+mn-lt"/>
+                <a:ea typeface="+mn-ea"/>
+                <a:cs typeface="+mn-cs"/>
+              </a:defRPr>
+            </a:lvl2pPr>
+            <a:lvl3pPr marL="914400" indent="0">
+              <a:defRPr sz="1100">
+                <a:solidFill>
+                  <a:schemeClr val="lt1"/>
+                </a:solidFill>
+                <a:latin typeface="+mn-lt"/>
+                <a:ea typeface="+mn-ea"/>
+                <a:cs typeface="+mn-cs"/>
+              </a:defRPr>
+            </a:lvl3pPr>
+            <a:lvl4pPr marL="1371600" indent="0">
+              <a:defRPr sz="1100">
+                <a:solidFill>
+                  <a:schemeClr val="lt1"/>
+                </a:solidFill>
+                <a:latin typeface="+mn-lt"/>
+                <a:ea typeface="+mn-ea"/>
+                <a:cs typeface="+mn-cs"/>
+              </a:defRPr>
+            </a:lvl4pPr>
+            <a:lvl5pPr marL="1828800" indent="0">
+              <a:defRPr sz="1100">
+                <a:solidFill>
+                  <a:schemeClr val="lt1"/>
+                </a:solidFill>
+                <a:latin typeface="+mn-lt"/>
+                <a:ea typeface="+mn-ea"/>
+                <a:cs typeface="+mn-cs"/>
+              </a:defRPr>
+            </a:lvl5pPr>
+            <a:lvl6pPr marL="2286000" indent="0">
+              <a:defRPr sz="1100">
+                <a:solidFill>
+                  <a:schemeClr val="lt1"/>
+                </a:solidFill>
+                <a:latin typeface="+mn-lt"/>
+                <a:ea typeface="+mn-ea"/>
+                <a:cs typeface="+mn-cs"/>
+              </a:defRPr>
+            </a:lvl6pPr>
+            <a:lvl7pPr marL="2743200" indent="0">
+              <a:defRPr sz="1100">
+                <a:solidFill>
+                  <a:schemeClr val="lt1"/>
+                </a:solidFill>
+                <a:latin typeface="+mn-lt"/>
+                <a:ea typeface="+mn-ea"/>
+                <a:cs typeface="+mn-cs"/>
+              </a:defRPr>
+            </a:lvl7pPr>
+            <a:lvl8pPr marL="3200400" indent="0">
+              <a:defRPr sz="1100">
+                <a:solidFill>
+                  <a:schemeClr val="lt1"/>
+                </a:solidFill>
+                <a:latin typeface="+mn-lt"/>
+                <a:ea typeface="+mn-ea"/>
+                <a:cs typeface="+mn-cs"/>
+              </a:defRPr>
+            </a:lvl8pPr>
+            <a:lvl9pPr marL="3657600" indent="0">
+              <a:defRPr sz="1100">
+                <a:solidFill>
+                  <a:schemeClr val="lt1"/>
+                </a:solidFill>
+                <a:latin typeface="+mn-lt"/>
+                <a:ea typeface="+mn-ea"/>
+                <a:cs typeface="+mn-cs"/>
+              </a:defRPr>
+            </a:lvl9pPr>
+          </a:lstStyle>
+          <a:p>
+            <a:pPr algn="ctr"/>
+            <a:r>
+              <a:rPr lang="en-GB" sz="1000"/>
+              <a:t>Of file paths</a:t>
+            </a:r>
+          </a:p>
+        </p:txBody>
+      </p:sp>
+      <p:sp>
+        <p:nvSpPr>
+          <p:cNvPr id="30" name="Speech Bubble: Rectangle with Corners Rounded 29">
+            <a:extLst>
+              <a:ext uri="{FF2B5EF4-FFF2-40B4-BE49-F238E27FC236}">
+                <a16:creationId xmlns:a16="http://schemas.microsoft.com/office/drawing/2014/main" id="{4EE59594-4785-8C72-22FA-2C0DBECF8552}"/>
+              </a:ext>
+            </a:extLst>
+          </p:cNvPr>
+          <p:cNvSpPr/>
+          <p:nvPr/>
+        </p:nvSpPr>
+        <p:spPr>
+          <a:xfrm>
+            <a:off x="3910056" y="873720"/>
+            <a:ext cx="1321360" cy="469785"/>
+          </a:xfrm>
+          <a:prstGeom prst="wedgeRoundRectCallout">
+            <a:avLst>
+              <a:gd name="adj1" fmla="val -68226"/>
+              <a:gd name="adj2" fmla="val 111673"/>
+              <a:gd name="adj3" fmla="val 16667"/>
+            </a:avLst>
+          </a:prstGeom>
+        </p:spPr>
+        <p:style>
+          <a:lnRef idx="2">
+            <a:schemeClr val="accent3">
+              <a:shade val="15000"/>
+            </a:schemeClr>
+          </a:lnRef>
+          <a:fillRef idx="1">
+            <a:schemeClr val="accent3"/>
+          </a:fillRef>
+          <a:effectRef idx="0">
+            <a:schemeClr val="accent3"/>
+          </a:effectRef>
+          <a:fontRef idx="minor">
+            <a:schemeClr val="lt1"/>
+          </a:fontRef>
+        </p:style>
+        <p:txBody>
+          <a:bodyPr wrap="square" rtlCol="0" anchor="ctr"/>
+          <a:lstStyle>
+            <a:lvl1pPr marL="0" indent="0">
+              <a:defRPr sz="1100">
+                <a:solidFill>
+                  <a:schemeClr val="lt1"/>
+                </a:solidFill>
+                <a:latin typeface="+mn-lt"/>
+                <a:ea typeface="+mn-ea"/>
+                <a:cs typeface="+mn-cs"/>
+              </a:defRPr>
+            </a:lvl1pPr>
+            <a:lvl2pPr marL="457200" indent="0">
+              <a:defRPr sz="1100">
+                <a:solidFill>
+                  <a:schemeClr val="lt1"/>
+                </a:solidFill>
+                <a:latin typeface="+mn-lt"/>
+                <a:ea typeface="+mn-ea"/>
+                <a:cs typeface="+mn-cs"/>
+              </a:defRPr>
+            </a:lvl2pPr>
+            <a:lvl3pPr marL="914400" indent="0">
+              <a:defRPr sz="1100">
+                <a:solidFill>
+                  <a:schemeClr val="lt1"/>
+                </a:solidFill>
+                <a:latin typeface="+mn-lt"/>
+                <a:ea typeface="+mn-ea"/>
+                <a:cs typeface="+mn-cs"/>
+              </a:defRPr>
+            </a:lvl3pPr>
+            <a:lvl4pPr marL="1371600" indent="0">
+              <a:defRPr sz="1100">
+                <a:solidFill>
+                  <a:schemeClr val="lt1"/>
+                </a:solidFill>
+                <a:latin typeface="+mn-lt"/>
+                <a:ea typeface="+mn-ea"/>
+                <a:cs typeface="+mn-cs"/>
+              </a:defRPr>
+            </a:lvl4pPr>
+            <a:lvl5pPr marL="1828800" indent="0">
+              <a:defRPr sz="1100">
+                <a:solidFill>
+                  <a:schemeClr val="lt1"/>
+                </a:solidFill>
+                <a:latin typeface="+mn-lt"/>
+                <a:ea typeface="+mn-ea"/>
+                <a:cs typeface="+mn-cs"/>
+              </a:defRPr>
+            </a:lvl5pPr>
+            <a:lvl6pPr marL="2286000" indent="0">
+              <a:defRPr sz="1100">
+                <a:solidFill>
+                  <a:schemeClr val="lt1"/>
+                </a:solidFill>
+                <a:latin typeface="+mn-lt"/>
+                <a:ea typeface="+mn-ea"/>
+                <a:cs typeface="+mn-cs"/>
+              </a:defRPr>
+            </a:lvl6pPr>
+            <a:lvl7pPr marL="2743200" indent="0">
+              <a:defRPr sz="1100">
+                <a:solidFill>
+                  <a:schemeClr val="lt1"/>
+                </a:solidFill>
+                <a:latin typeface="+mn-lt"/>
+                <a:ea typeface="+mn-ea"/>
+                <a:cs typeface="+mn-cs"/>
+              </a:defRPr>
+            </a:lvl7pPr>
+            <a:lvl8pPr marL="3200400" indent="0">
+              <a:defRPr sz="1100">
+                <a:solidFill>
+                  <a:schemeClr val="lt1"/>
+                </a:solidFill>
+                <a:latin typeface="+mn-lt"/>
+                <a:ea typeface="+mn-ea"/>
+                <a:cs typeface="+mn-cs"/>
+              </a:defRPr>
+            </a:lvl8pPr>
+            <a:lvl9pPr marL="3657600" indent="0">
+              <a:defRPr sz="1100">
+                <a:solidFill>
+                  <a:schemeClr val="lt1"/>
+                </a:solidFill>
+                <a:latin typeface="+mn-lt"/>
+                <a:ea typeface="+mn-ea"/>
+                <a:cs typeface="+mn-cs"/>
+              </a:defRPr>
+            </a:lvl9pPr>
+          </a:lstStyle>
+          <a:p>
+            <a:pPr algn="ctr"/>
+            <a:r>
+              <a:rPr lang="en-GB" sz="1000"/>
+              <a:t>Of results</a:t>
+            </a:r>
+          </a:p>
+        </p:txBody>
+      </p:sp>
+      <p:sp>
+        <p:nvSpPr>
+          <p:cNvPr id="31" name="Rectangle 30">
+            <a:extLst>
+              <a:ext uri="{FF2B5EF4-FFF2-40B4-BE49-F238E27FC236}">
+                <a16:creationId xmlns:a16="http://schemas.microsoft.com/office/drawing/2014/main" id="{F370F9C3-F1EC-6E0F-70CA-2E7BF7600E57}"/>
+              </a:ext>
+            </a:extLst>
+          </p:cNvPr>
+          <p:cNvSpPr/>
+          <p:nvPr/>
+        </p:nvSpPr>
+        <p:spPr>
+          <a:xfrm>
+            <a:off x="1608665" y="5806736"/>
+            <a:ext cx="1748071" cy="464234"/>
+          </a:xfrm>
+          <a:prstGeom prst="rect">
+            <a:avLst/>
+          </a:prstGeom>
+          <a:solidFill>
+            <a:schemeClr val="tx1">
+              <a:lumMod val="50000"/>
+              <a:lumOff val="50000"/>
+            </a:schemeClr>
+          </a:solidFill>
+        </p:spPr>
+        <p:style>
+          <a:lnRef idx="2">
+            <a:schemeClr val="accent1">
+              <a:shade val="15000"/>
+            </a:schemeClr>
+          </a:lnRef>
+          <a:fillRef idx="1">
+            <a:schemeClr val="accent1"/>
+          </a:fillRef>
+          <a:effectRef idx="0">
+            <a:schemeClr val="accent1"/>
+          </a:effectRef>
+          <a:fontRef idx="minor">
+            <a:schemeClr val="lt1"/>
+          </a:fontRef>
+        </p:style>
+        <p:txBody>
+          <a:bodyPr wrap="square" rtlCol="0" anchor="ctr"/>
+          <a:lstStyle>
+            <a:lvl1pPr marL="0" indent="0">
+              <a:defRPr sz="1100">
+                <a:solidFill>
+                  <a:schemeClr val="lt1"/>
+                </a:solidFill>
+                <a:latin typeface="+mn-lt"/>
+                <a:ea typeface="+mn-ea"/>
+                <a:cs typeface="+mn-cs"/>
+              </a:defRPr>
+            </a:lvl1pPr>
+            <a:lvl2pPr marL="457200" indent="0">
+              <a:defRPr sz="1100">
+                <a:solidFill>
+                  <a:schemeClr val="lt1"/>
+                </a:solidFill>
+                <a:latin typeface="+mn-lt"/>
+                <a:ea typeface="+mn-ea"/>
+                <a:cs typeface="+mn-cs"/>
+              </a:defRPr>
+            </a:lvl2pPr>
+            <a:lvl3pPr marL="914400" indent="0">
+              <a:defRPr sz="1100">
+                <a:solidFill>
+                  <a:schemeClr val="lt1"/>
+                </a:solidFill>
+                <a:latin typeface="+mn-lt"/>
+                <a:ea typeface="+mn-ea"/>
+                <a:cs typeface="+mn-cs"/>
+              </a:defRPr>
+            </a:lvl3pPr>
+            <a:lvl4pPr marL="1371600" indent="0">
+              <a:defRPr sz="1100">
+                <a:solidFill>
+                  <a:schemeClr val="lt1"/>
+                </a:solidFill>
+                <a:latin typeface="+mn-lt"/>
+                <a:ea typeface="+mn-ea"/>
+                <a:cs typeface="+mn-cs"/>
+              </a:defRPr>
+            </a:lvl4pPr>
+            <a:lvl5pPr marL="1828800" indent="0">
+              <a:defRPr sz="1100">
+                <a:solidFill>
+                  <a:schemeClr val="lt1"/>
+                </a:solidFill>
+                <a:latin typeface="+mn-lt"/>
+                <a:ea typeface="+mn-ea"/>
+                <a:cs typeface="+mn-cs"/>
+              </a:defRPr>
+            </a:lvl5pPr>
+            <a:lvl6pPr marL="2286000" indent="0">
+              <a:defRPr sz="1100">
+                <a:solidFill>
+                  <a:schemeClr val="lt1"/>
+                </a:solidFill>
+                <a:latin typeface="+mn-lt"/>
+                <a:ea typeface="+mn-ea"/>
+                <a:cs typeface="+mn-cs"/>
+              </a:defRPr>
+            </a:lvl6pPr>
+            <a:lvl7pPr marL="2743200" indent="0">
+              <a:defRPr sz="1100">
+                <a:solidFill>
+                  <a:schemeClr val="lt1"/>
+                </a:solidFill>
+                <a:latin typeface="+mn-lt"/>
+                <a:ea typeface="+mn-ea"/>
+                <a:cs typeface="+mn-cs"/>
+              </a:defRPr>
+            </a:lvl7pPr>
+            <a:lvl8pPr marL="3200400" indent="0">
+              <a:defRPr sz="1100">
+                <a:solidFill>
+                  <a:schemeClr val="lt1"/>
+                </a:solidFill>
+                <a:latin typeface="+mn-lt"/>
+                <a:ea typeface="+mn-ea"/>
+                <a:cs typeface="+mn-cs"/>
+              </a:defRPr>
+            </a:lvl8pPr>
+            <a:lvl9pPr marL="3657600" indent="0">
+              <a:defRPr sz="1100">
+                <a:solidFill>
+                  <a:schemeClr val="lt1"/>
+                </a:solidFill>
+                <a:latin typeface="+mn-lt"/>
+                <a:ea typeface="+mn-ea"/>
+                <a:cs typeface="+mn-cs"/>
+              </a:defRPr>
+            </a:lvl9pPr>
+          </a:lstStyle>
+          <a:p>
+            <a:pPr algn="ctr"/>
+            <a:r>
+              <a:rPr lang="en-GB"/>
+              <a:t>stdPicture</a:t>
+            </a:r>
+          </a:p>
+        </p:txBody>
+      </p:sp>
+      <p:cxnSp>
+        <p:nvCxnSpPr>
+          <p:cNvPr id="32" name="Straight Arrow Connector 31">
+            <a:extLst>
+              <a:ext uri="{FF2B5EF4-FFF2-40B4-BE49-F238E27FC236}">
+                <a16:creationId xmlns:a16="http://schemas.microsoft.com/office/drawing/2014/main" id="{010E4B00-4693-41E8-B66A-D48FEB724C73}"/>
+              </a:ext>
+            </a:extLst>
+          </p:cNvPr>
+          <p:cNvCxnSpPr>
+            <a:cxnSpLocks/>
+            <a:stCxn id="31" idx="3"/>
+            <a:endCxn id="16" idx="1"/>
+          </p:cNvCxnSpPr>
+          <p:nvPr/>
+        </p:nvCxnSpPr>
+        <p:spPr>
+          <a:xfrm flipV="1">
+            <a:off x="3356736" y="4523351"/>
+            <a:ext cx="531107" cy="1515502"/>
+          </a:xfrm>
+          <a:prstGeom prst="straightConnector1">
+            <a:avLst/>
+          </a:prstGeom>
+          <a:ln>
+            <a:solidFill>
+              <a:srgbClr val="002060"/>
+            </a:solidFill>
+            <a:tailEnd type="triangle"/>
+          </a:ln>
+        </p:spPr>
+        <p:style>
+          <a:lnRef idx="1">
+            <a:schemeClr val="accent1"/>
+          </a:lnRef>
+          <a:fillRef idx="0">
+            <a:schemeClr val="accent1"/>
+          </a:fillRef>
+          <a:effectRef idx="0">
+            <a:schemeClr val="accent1"/>
+          </a:effectRef>
+          <a:fontRef idx="minor">
+            <a:schemeClr val="tx1"/>
+          </a:fontRef>
+        </p:style>
+      </p:cxnSp>
+    </p:spTree>
+    <p:extLst>
+      <p:ext uri="{BB962C8B-B14F-4D97-AF65-F5344CB8AC3E}">
+        <p14:creationId xmlns:p14="http://schemas.microsoft.com/office/powerpoint/2010/main" val="1500881741"/>
+      </p:ext>
+    </p:extLst>
+  </p:cSld>
+  <p:clrMapOvr>
+    <a:masterClrMapping/>
+  </p:clrMapOvr>
+</p:sld>
+</file>
+
 <file path=ppt/theme/theme1.xml><?xml version="1.0" encoding="utf-8"?>
 <a:theme xmlns:a="http://schemas.openxmlformats.org/drawingml/2006/main" name="Office Theme">
   <a:themeElements>

</xml_diff>